<commit_message>
Posters and Flyers Complete
</commit_message>
<xml_diff>
--- a/Offline/Marketing/MarketingArtworks/pptx/FlyerBrandAmbassador.pptx
+++ b/Offline/Marketing/MarketingArtworks/pptx/FlyerBrandAmbassador.pptx
@@ -6,7 +6,7 @@
   </p:sldMasterIdLst>
   <p:sldIdLst>
     <p:sldId id="256" r:id="rId2"/>
-    <p:sldId id="258" r:id="rId3"/>
+    <p:sldId id="259" r:id="rId3"/>
   </p:sldIdLst>
   <p:sldSz cx="25603200" cy="36328350"/>
   <p:notesSz cx="6858000" cy="9144000"/>
@@ -244,7 +244,7 @@
           <a:p>
             <a:fld id="{E3759604-EFD2-4C79-BE13-E71CA39EA512}" type="datetimeFigureOut">
               <a:rPr lang="en-US" smtClean="0"/>
-              <a:t>8/11/2023</a:t>
+              <a:t>8/13/2023</a:t>
             </a:fld>
             <a:endParaRPr lang="en-US"/>
           </a:p>
@@ -414,7 +414,7 @@
           <a:p>
             <a:fld id="{E3759604-EFD2-4C79-BE13-E71CA39EA512}" type="datetimeFigureOut">
               <a:rPr lang="en-US" smtClean="0"/>
-              <a:t>8/11/2023</a:t>
+              <a:t>8/13/2023</a:t>
             </a:fld>
             <a:endParaRPr lang="en-US"/>
           </a:p>
@@ -594,7 +594,7 @@
           <a:p>
             <a:fld id="{E3759604-EFD2-4C79-BE13-E71CA39EA512}" type="datetimeFigureOut">
               <a:rPr lang="en-US" smtClean="0"/>
-              <a:t>8/11/2023</a:t>
+              <a:t>8/13/2023</a:t>
             </a:fld>
             <a:endParaRPr lang="en-US"/>
           </a:p>
@@ -764,7 +764,7 @@
           <a:p>
             <a:fld id="{E3759604-EFD2-4C79-BE13-E71CA39EA512}" type="datetimeFigureOut">
               <a:rPr lang="en-US" smtClean="0"/>
-              <a:t>8/11/2023</a:t>
+              <a:t>8/13/2023</a:t>
             </a:fld>
             <a:endParaRPr lang="en-US"/>
           </a:p>
@@ -1008,7 +1008,7 @@
           <a:p>
             <a:fld id="{E3759604-EFD2-4C79-BE13-E71CA39EA512}" type="datetimeFigureOut">
               <a:rPr lang="en-US" smtClean="0"/>
-              <a:t>8/11/2023</a:t>
+              <a:t>8/13/2023</a:t>
             </a:fld>
             <a:endParaRPr lang="en-US"/>
           </a:p>
@@ -1240,7 +1240,7 @@
           <a:p>
             <a:fld id="{E3759604-EFD2-4C79-BE13-E71CA39EA512}" type="datetimeFigureOut">
               <a:rPr lang="en-US" smtClean="0"/>
-              <a:t>8/11/2023</a:t>
+              <a:t>8/13/2023</a:t>
             </a:fld>
             <a:endParaRPr lang="en-US"/>
           </a:p>
@@ -1607,7 +1607,7 @@
           <a:p>
             <a:fld id="{E3759604-EFD2-4C79-BE13-E71CA39EA512}" type="datetimeFigureOut">
               <a:rPr lang="en-US" smtClean="0"/>
-              <a:t>8/11/2023</a:t>
+              <a:t>8/13/2023</a:t>
             </a:fld>
             <a:endParaRPr lang="en-US"/>
           </a:p>
@@ -1725,7 +1725,7 @@
           <a:p>
             <a:fld id="{E3759604-EFD2-4C79-BE13-E71CA39EA512}" type="datetimeFigureOut">
               <a:rPr lang="en-US" smtClean="0"/>
-              <a:t>8/11/2023</a:t>
+              <a:t>8/13/2023</a:t>
             </a:fld>
             <a:endParaRPr lang="en-US"/>
           </a:p>
@@ -1820,7 +1820,7 @@
           <a:p>
             <a:fld id="{E3759604-EFD2-4C79-BE13-E71CA39EA512}" type="datetimeFigureOut">
               <a:rPr lang="en-US" smtClean="0"/>
-              <a:t>8/11/2023</a:t>
+              <a:t>8/13/2023</a:t>
             </a:fld>
             <a:endParaRPr lang="en-US"/>
           </a:p>
@@ -2097,7 +2097,7 @@
           <a:p>
             <a:fld id="{E3759604-EFD2-4C79-BE13-E71CA39EA512}" type="datetimeFigureOut">
               <a:rPr lang="en-US" smtClean="0"/>
-              <a:t>8/11/2023</a:t>
+              <a:t>8/13/2023</a:t>
             </a:fld>
             <a:endParaRPr lang="en-US"/>
           </a:p>
@@ -2354,7 +2354,7 @@
           <a:p>
             <a:fld id="{E3759604-EFD2-4C79-BE13-E71CA39EA512}" type="datetimeFigureOut">
               <a:rPr lang="en-US" smtClean="0"/>
-              <a:t>8/11/2023</a:t>
+              <a:t>8/13/2023</a:t>
             </a:fld>
             <a:endParaRPr lang="en-US"/>
           </a:p>
@@ -2567,7 +2567,7 @@
           <a:p>
             <a:fld id="{E3759604-EFD2-4C79-BE13-E71CA39EA512}" type="datetimeFigureOut">
               <a:rPr lang="en-US" smtClean="0"/>
-              <a:t>8/11/2023</a:t>
+              <a:t>8/13/2023</a:t>
             </a:fld>
             <a:endParaRPr lang="en-US"/>
           </a:p>
@@ -3030,7 +3030,7 @@
         </p:blipFill>
         <p:spPr>
           <a:xfrm>
-            <a:off x="12623134" y="7956253"/>
+            <a:off x="12599071" y="7932190"/>
             <a:ext cx="13006052" cy="19304211"/>
           </a:xfrm>
           <a:prstGeom prst="rect">
@@ -3040,10 +3040,10 @@
       </p:pic>
       <p:pic>
         <p:nvPicPr>
-          <p:cNvPr id="13" name="Picture 12">
+          <p:cNvPr id="17" name="Picture 16">
             <a:extLst>
               <a:ext uri="{FF2B5EF4-FFF2-40B4-BE49-F238E27FC236}">
-                <a16:creationId xmlns:a16="http://schemas.microsoft.com/office/drawing/2014/main" id="{0B8D66B7-B7EF-A10E-ACF6-180961A64482}"/>
+                <a16:creationId xmlns:a16="http://schemas.microsoft.com/office/drawing/2014/main" id="{2A88CD58-A345-2D82-B535-B54DF3C15F5C}"/>
               </a:ext>
             </a:extLst>
           </p:cNvPr>
@@ -3065,9 +3065,9 @@
           </a:stretch>
         </p:blipFill>
         <p:spPr>
-          <a:xfrm>
-            <a:off x="6859159" y="508673"/>
-            <a:ext cx="11863671" cy="5762356"/>
+          <a:xfrm rot="21440353">
+            <a:off x="14522874" y="16214797"/>
+            <a:ext cx="1197356" cy="1131942"/>
           </a:xfrm>
           <a:prstGeom prst="rect">
             <a:avLst/>
@@ -3076,10 +3076,10 @@
       </p:pic>
       <p:sp>
         <p:nvSpPr>
-          <p:cNvPr id="37" name="TextBox 36">
+          <p:cNvPr id="2" name="TextBox 1">
             <a:extLst>
               <a:ext uri="{FF2B5EF4-FFF2-40B4-BE49-F238E27FC236}">
-                <a16:creationId xmlns:a16="http://schemas.microsoft.com/office/drawing/2014/main" id="{D8F4ED22-01EC-7429-671A-220A0C689694}"/>
+                <a16:creationId xmlns:a16="http://schemas.microsoft.com/office/drawing/2014/main" id="{0B1F067C-15E6-4EF0-8CC5-A48BB433BBDE}"/>
               </a:ext>
             </a:extLst>
           </p:cNvPr>
@@ -3115,7 +3115,7 @@
                   <a:srgbClr val="C00000"/>
                 </a:solidFill>
                 <a:effectLst>
-                  <a:glow rad="50800">
+                  <a:glow>
                     <a:srgbClr val="C00000">
                       <a:alpha val="40000"/>
                     </a:srgbClr>
@@ -3141,7 +3141,7 @@
                 <a:srgbClr val="C00000"/>
               </a:solidFill>
               <a:effectLst>
-                <a:glow rad="50800">
+                <a:glow>
                   <a:srgbClr val="C00000">
                     <a:alpha val="40000"/>
                   </a:srgbClr>
@@ -3159,10 +3159,10 @@
       </p:sp>
       <p:sp>
         <p:nvSpPr>
-          <p:cNvPr id="39" name="TextBox 38">
+          <p:cNvPr id="18" name="TextBox 17">
             <a:extLst>
               <a:ext uri="{FF2B5EF4-FFF2-40B4-BE49-F238E27FC236}">
-                <a16:creationId xmlns:a16="http://schemas.microsoft.com/office/drawing/2014/main" id="{F71474C8-D56F-A009-1E43-209F024854AC}"/>
+                <a16:creationId xmlns:a16="http://schemas.microsoft.com/office/drawing/2014/main" id="{06CB3FBB-DC0F-2C60-C2E5-22EAC1BE33DC}"/>
               </a:ext>
             </a:extLst>
           </p:cNvPr>
@@ -3218,10 +3218,10 @@
       </p:sp>
       <p:pic>
         <p:nvPicPr>
-          <p:cNvPr id="40" name="Picture 14" descr="Whatsapp Icon PNGs for Free Download">
+          <p:cNvPr id="19" name="Picture 14" descr="Whatsapp Icon PNGs for Free Download">
             <a:extLst>
               <a:ext uri="{FF2B5EF4-FFF2-40B4-BE49-F238E27FC236}">
-                <a16:creationId xmlns:a16="http://schemas.microsoft.com/office/drawing/2014/main" id="{4614A863-72B5-6D79-5611-3F749E580A6C}"/>
+                <a16:creationId xmlns:a16="http://schemas.microsoft.com/office/drawing/2014/main" id="{90864241-D086-E70B-0756-01CA63BFFF7D}"/>
               </a:ext>
             </a:extLst>
           </p:cNvPr>
@@ -3265,10 +3265,10 @@
       </p:pic>
       <p:sp>
         <p:nvSpPr>
-          <p:cNvPr id="41" name="Rectangle 40">
+          <p:cNvPr id="20" name="Rectangle 19">
             <a:extLst>
               <a:ext uri="{FF2B5EF4-FFF2-40B4-BE49-F238E27FC236}">
-                <a16:creationId xmlns:a16="http://schemas.microsoft.com/office/drawing/2014/main" id="{F9D8F186-43FC-19CD-B884-5AEC7E1E6390}"/>
+                <a16:creationId xmlns:a16="http://schemas.microsoft.com/office/drawing/2014/main" id="{5E9C28B4-4C26-7E3E-3AC0-2FCE15D0CB90}"/>
               </a:ext>
             </a:extLst>
           </p:cNvPr>
@@ -3307,7 +3307,7 @@
                   <a:srgbClr val="C00000"/>
                 </a:solidFill>
                 <a:effectLst>
-                  <a:glow rad="63500">
+                  <a:glow>
                     <a:srgbClr val="C00000">
                       <a:alpha val="40000"/>
                     </a:srgbClr>
@@ -3333,7 +3333,7 @@
                 <a:srgbClr val="C00000"/>
               </a:solidFill>
               <a:effectLst>
-                <a:glow rad="63500">
+                <a:glow>
                   <a:srgbClr val="C00000">
                     <a:alpha val="40000"/>
                   </a:srgbClr>
@@ -3351,10 +3351,10 @@
       </p:sp>
       <p:pic>
         <p:nvPicPr>
-          <p:cNvPr id="42" name="Picture 18" descr="Page 2 | Phone Icon Png Images - Free Download on Freepik">
+          <p:cNvPr id="23" name="Picture 18" descr="Page 2 | Phone Icon Png Images - Free Download on Freepik">
             <a:extLst>
               <a:ext uri="{FF2B5EF4-FFF2-40B4-BE49-F238E27FC236}">
-                <a16:creationId xmlns:a16="http://schemas.microsoft.com/office/drawing/2014/main" id="{0AE7602C-AB89-8DF9-830B-C813846C2C66}"/>
+                <a16:creationId xmlns:a16="http://schemas.microsoft.com/office/drawing/2014/main" id="{68754D08-7C19-2B88-9C12-49F52C9043D3}"/>
               </a:ext>
             </a:extLst>
           </p:cNvPr>
@@ -3398,10 +3398,10 @@
       </p:pic>
       <p:pic>
         <p:nvPicPr>
-          <p:cNvPr id="17" name="Picture 16">
+          <p:cNvPr id="13" name="Picture 12">
             <a:extLst>
               <a:ext uri="{FF2B5EF4-FFF2-40B4-BE49-F238E27FC236}">
-                <a16:creationId xmlns:a16="http://schemas.microsoft.com/office/drawing/2014/main" id="{2A88CD58-A345-2D82-B535-B54DF3C15F5C}"/>
+                <a16:creationId xmlns:a16="http://schemas.microsoft.com/office/drawing/2014/main" id="{0B8D66B7-B7EF-A10E-ACF6-180961A64482}"/>
               </a:ext>
             </a:extLst>
           </p:cNvPr>
@@ -3423,9 +3423,9 @@
           </a:stretch>
         </p:blipFill>
         <p:spPr>
-          <a:xfrm rot="21440353">
-            <a:off x="14546938" y="16262925"/>
-            <a:ext cx="1197356" cy="1131942"/>
+          <a:xfrm>
+            <a:off x="7398417" y="770599"/>
+            <a:ext cx="10785155" cy="5238505"/>
           </a:xfrm>
           <a:prstGeom prst="rect">
             <a:avLst/>
@@ -3434,10 +3434,10 @@
       </p:pic>
       <p:sp>
         <p:nvSpPr>
-          <p:cNvPr id="9" name="32-Point Star 20">
+          <p:cNvPr id="21" name="32-Point Star 20">
             <a:extLst>
               <a:ext uri="{FF2B5EF4-FFF2-40B4-BE49-F238E27FC236}">
-                <a16:creationId xmlns:a16="http://schemas.microsoft.com/office/drawing/2014/main" id="{013D7344-D51C-35DC-9DCB-9528C8A4AFF7}"/>
+                <a16:creationId xmlns:a16="http://schemas.microsoft.com/office/drawing/2014/main" id="{0B441B03-B3CF-3C83-9688-DBD8A37CF276}"/>
               </a:ext>
             </a:extLst>
           </p:cNvPr>
@@ -3446,18 +3446,18 @@
         </p:nvSpPr>
         <p:spPr>
           <a:xfrm rot="21243013">
-            <a:off x="7519533" y="8921463"/>
-            <a:ext cx="9704255" cy="6077043"/>
+            <a:off x="7320096" y="9473933"/>
+            <a:ext cx="10815524" cy="5872272"/>
           </a:xfrm>
           <a:prstGeom prst="star32">
             <a:avLst/>
           </a:prstGeom>
           <a:solidFill>
-            <a:srgbClr val="002060"/>
+            <a:srgbClr val="FF0000"/>
           </a:solidFill>
-          <a:ln w="317500">
+          <a:ln w="254000">
             <a:solidFill>
-              <a:srgbClr val="FF0000"/>
+              <a:srgbClr val="0066FF"/>
             </a:solidFill>
           </a:ln>
         </p:spPr>
@@ -3483,16 +3483,25 @@
           <a:p>
             <a:pPr algn="ctr"/>
             <a:r>
-              <a:rPr lang="en-US" sz="3600" b="1" cap="small" dirty="0">
+              <a:rPr lang="en-US" sz="4400" b="1" cap="small" dirty="0">
                 <a:solidFill>
                   <a:schemeClr val="bg1"/>
                 </a:solidFill>
                 <a:latin typeface="Oxygen" panose="02000503000000000000" pitchFamily="2" charset="0"/>
               </a:rPr>
-              <a:t>Upto </a:t>
-            </a:r>
-            <a:r>
-              <a:rPr lang="en-US" sz="15000" b="1" cap="small" dirty="0">
+              <a:t>Upto</a:t>
+            </a:r>
+            <a:r>
+              <a:rPr lang="en-US" sz="3200" b="1" cap="small" dirty="0">
+                <a:solidFill>
+                  <a:schemeClr val="bg1"/>
+                </a:solidFill>
+                <a:latin typeface="Oxygen" panose="02000503000000000000" pitchFamily="2" charset="0"/>
+              </a:rPr>
+              <a:t> </a:t>
+            </a:r>
+            <a:r>
+              <a:rPr lang="en-US" sz="11600" b="1" cap="small" dirty="0">
                 <a:solidFill>
                   <a:schemeClr val="bg1"/>
                 </a:solidFill>
@@ -3501,16 +3510,7 @@
               <a:t>50%</a:t>
             </a:r>
             <a:r>
-              <a:rPr lang="en-US" sz="3600" b="1" cap="small" dirty="0">
-                <a:solidFill>
-                  <a:schemeClr val="bg1"/>
-                </a:solidFill>
-                <a:latin typeface="Oxygen" panose="02000503000000000000" pitchFamily="2" charset="0"/>
-              </a:rPr>
-              <a:t> Off</a:t>
-            </a:r>
-            <a:r>
-              <a:rPr lang="en-US" sz="5400" b="1" cap="small" dirty="0">
+              <a:rPr lang="en-US" sz="3200" b="1" cap="small" dirty="0">
                 <a:solidFill>
                   <a:schemeClr val="bg1"/>
                 </a:solidFill>
@@ -3518,27 +3518,51 @@
               </a:rPr>
               <a:t> </a:t>
             </a:r>
-          </a:p>
-          <a:p>
-            <a:pPr algn="ctr"/>
-            <a:r>
-              <a:rPr lang="en-US" sz="3600" b="1" cap="small" dirty="0">
+            <a:r>
+              <a:rPr lang="en-US" sz="4400" b="1" cap="small" dirty="0">
                 <a:solidFill>
                   <a:schemeClr val="bg1"/>
                 </a:solidFill>
                 <a:latin typeface="Oxygen" panose="02000503000000000000" pitchFamily="2" charset="0"/>
               </a:rPr>
-              <a:t>T&amp;C Applies</a:t>
-            </a:r>
+              <a:t>Off</a:t>
+            </a:r>
+            <a:r>
+              <a:rPr lang="en-US" sz="6000" b="1" cap="small" dirty="0">
+                <a:solidFill>
+                  <a:schemeClr val="bg1"/>
+                </a:solidFill>
+                <a:latin typeface="Oxygen" panose="02000503000000000000" pitchFamily="2" charset="0"/>
+              </a:rPr>
+              <a:t> </a:t>
+            </a:r>
+          </a:p>
+          <a:p>
+            <a:pPr algn="ctr"/>
+            <a:r>
+              <a:rPr lang="en-US" sz="4400" b="1" cap="small" dirty="0">
+                <a:solidFill>
+                  <a:schemeClr val="bg1"/>
+                </a:solidFill>
+                <a:latin typeface="Oxygen" panose="02000503000000000000" pitchFamily="2" charset="0"/>
+              </a:rPr>
+              <a:t>T&amp;C Apply</a:t>
+            </a:r>
+            <a:endParaRPr lang="en-US" sz="2800" b="1" cap="small" dirty="0">
+              <a:solidFill>
+                <a:schemeClr val="bg1"/>
+              </a:solidFill>
+              <a:latin typeface="Oxygen" panose="02000503000000000000" pitchFamily="2" charset="0"/>
+            </a:endParaRPr>
           </a:p>
         </p:txBody>
       </p:sp>
       <p:pic>
         <p:nvPicPr>
-          <p:cNvPr id="5" name="Picture 4">
+          <p:cNvPr id="24" name="Picture 23">
             <a:extLst>
               <a:ext uri="{FF2B5EF4-FFF2-40B4-BE49-F238E27FC236}">
-                <a16:creationId xmlns:a16="http://schemas.microsoft.com/office/drawing/2014/main" id="{AC73743A-F8AA-2C8D-2E19-037F2BC146F7}"/>
+                <a16:creationId xmlns:a16="http://schemas.microsoft.com/office/drawing/2014/main" id="{13827870-A163-6000-BB37-8CE42441BBFF}"/>
               </a:ext>
             </a:extLst>
           </p:cNvPr>
@@ -3554,7 +3578,7 @@
                 <a14:imgProps xmlns:a14="http://schemas.microsoft.com/office/drawing/2010/main">
                   <a14:imgLayer r:embed="rId9">
                     <a14:imgEffect>
-                      <a14:brightnessContrast bright="20000" contrast="20000"/>
+                      <a14:brightnessContrast bright="30000" contrast="30000"/>
                     </a14:imgEffect>
                   </a14:imgLayer>
                 </a14:imgProps>
@@ -3569,45 +3593,15 @@
           </a:stretch>
         </p:blipFill>
         <p:spPr>
-          <a:xfrm rot="21326279">
-            <a:off x="-8164279" y="1539638"/>
-            <a:ext cx="24035614" cy="33612587"/>
+          <a:xfrm>
+            <a:off x="832265" y="8495095"/>
+            <a:ext cx="8775366" cy="13611678"/>
           </a:xfrm>
           <a:prstGeom prst="rect">
             <a:avLst/>
           </a:prstGeom>
         </p:spPr>
       </p:pic>
-      <p:pic>
-        <p:nvPicPr>
-          <p:cNvPr id="29" name="Picture 28">
-            <a:extLst>
-              <a:ext uri="{FF2B5EF4-FFF2-40B4-BE49-F238E27FC236}">
-                <a16:creationId xmlns:a16="http://schemas.microsoft.com/office/drawing/2014/main" id="{A622DD28-862B-63BF-DF65-1EC2D878807E}"/>
-              </a:ext>
-            </a:extLst>
-          </p:cNvPr>
-          <p:cNvPicPr>
-            <a:picLocks noChangeAspect="1"/>
-          </p:cNvPicPr>
-          <p:nvPr/>
-        </p:nvPicPr>
-        <p:blipFill>
-          <a:blip r:embed="rId10"/>
-          <a:stretch>
-            <a:fillRect/>
-          </a:stretch>
-        </p:blipFill>
-        <p:spPr>
-          <a:xfrm>
-            <a:off x="4700" y="18204783"/>
-            <a:ext cx="7434293" cy="1789129"/>
-          </a:xfrm>
-          <a:prstGeom prst="rect">
-            <a:avLst/>
-          </a:prstGeom>
-        </p:spPr>
-      </p:pic>
       <p:sp>
         <p:nvSpPr>
           <p:cNvPr id="22" name="Rectangle 21">
@@ -3622,8 +3616,8 @@
         </p:nvSpPr>
         <p:spPr>
           <a:xfrm>
-            <a:off x="-7481" y="20795131"/>
-            <a:ext cx="14345754" cy="15305157"/>
+            <a:off x="-5936" y="20810219"/>
+            <a:ext cx="13463607" cy="5605091"/>
           </a:xfrm>
           <a:prstGeom prst="rect">
             <a:avLst/>
@@ -3660,166 +3654,12 @@
           </a:p>
         </p:txBody>
       </p:sp>
-      <p:sp>
-        <p:nvSpPr>
-          <p:cNvPr id="24" name="TextBox 23">
-            <a:extLst>
-              <a:ext uri="{FF2B5EF4-FFF2-40B4-BE49-F238E27FC236}">
-                <a16:creationId xmlns:a16="http://schemas.microsoft.com/office/drawing/2014/main" id="{E8FDE4AC-06D7-40A5-3B56-9AC82D0DC8E9}"/>
-              </a:ext>
-            </a:extLst>
-          </p:cNvPr>
-          <p:cNvSpPr txBox="1"/>
-          <p:nvPr/>
-        </p:nvSpPr>
-        <p:spPr>
-          <a:xfrm>
-            <a:off x="87008" y="25085251"/>
-            <a:ext cx="25589322" cy="8193718"/>
-          </a:xfrm>
-          <a:prstGeom prst="rect">
-            <a:avLst/>
-          </a:prstGeom>
-          <a:noFill/>
-        </p:spPr>
-        <p:txBody>
-          <a:bodyPr wrap="square">
-            <a:spAutoFit/>
-          </a:bodyPr>
-          <a:lstStyle/>
-          <a:p>
-            <a:pPr algn="ctr">
-              <a:lnSpc>
-                <a:spcPct val="150000"/>
-              </a:lnSpc>
-            </a:pPr>
-            <a:r>
-              <a:rPr lang="en-US" sz="7200" b="1" cap="small" dirty="0">
-                <a:solidFill>
-                  <a:srgbClr val="C00000"/>
-                </a:solidFill>
-                <a:latin typeface="Oxygen" panose="02000503000000000000" pitchFamily="2" charset="0"/>
-              </a:rPr>
-              <a:t>VIII-XII - ICSE/CBSE/WB - Science, Arts, Comm</a:t>
-            </a:r>
-          </a:p>
-          <a:p>
-            <a:pPr algn="ctr">
-              <a:lnSpc>
-                <a:spcPct val="150000"/>
-              </a:lnSpc>
-            </a:pPr>
-            <a:r>
-              <a:rPr lang="en-US" sz="7200" b="1" cap="small" dirty="0">
-                <a:solidFill>
-                  <a:srgbClr val="C00000"/>
-                </a:solidFill>
-                <a:latin typeface="Oxygen" panose="02000503000000000000" pitchFamily="2" charset="0"/>
-              </a:rPr>
-              <a:t>NEET, IIT-JEE (Mains, Adv)</a:t>
-            </a:r>
-          </a:p>
-          <a:p>
-            <a:pPr algn="ctr">
-              <a:lnSpc>
-                <a:spcPct val="150000"/>
-              </a:lnSpc>
-            </a:pPr>
-            <a:r>
-              <a:rPr lang="en-US" sz="7200" b="1" cap="small" dirty="0">
-                <a:solidFill>
-                  <a:srgbClr val="C00000"/>
-                </a:solidFill>
-                <a:latin typeface="Oxygen" panose="02000503000000000000" pitchFamily="2" charset="0"/>
-              </a:rPr>
-              <a:t>BCom, BBA, CA, CMA, CS, CFA, CLAT, LLB, LLM</a:t>
-            </a:r>
-          </a:p>
-          <a:p>
-            <a:pPr algn="ctr">
-              <a:lnSpc>
-                <a:spcPct val="150000"/>
-              </a:lnSpc>
-            </a:pPr>
-            <a:r>
-              <a:rPr lang="en-US" sz="7200" b="1" cap="small" dirty="0">
-                <a:solidFill>
-                  <a:srgbClr val="C00000"/>
-                </a:solidFill>
-                <a:latin typeface="Oxygen" panose="02000503000000000000" pitchFamily="2" charset="0"/>
-              </a:rPr>
-              <a:t>AI &amp; IT Training &amp; Projects</a:t>
-            </a:r>
-          </a:p>
-          <a:p>
-            <a:pPr algn="ctr">
-              <a:lnSpc>
-                <a:spcPct val="150000"/>
-              </a:lnSpc>
-            </a:pPr>
-            <a:r>
-              <a:rPr lang="en-US" sz="7200" b="1" cap="small" dirty="0">
-                <a:solidFill>
-                  <a:srgbClr val="C00000"/>
-                </a:solidFill>
-                <a:latin typeface="Oxygen" panose="02000503000000000000" pitchFamily="2" charset="0"/>
-              </a:rPr>
-              <a:t> Grooming, Ielts, Toefl, Foreign Languages</a:t>
-            </a:r>
-            <a:endParaRPr lang="en-US" sz="8800" b="1" cap="small" dirty="0">
-              <a:solidFill>
-                <a:srgbClr val="C00000"/>
-              </a:solidFill>
-              <a:latin typeface="Oxygen" panose="02000503000000000000" pitchFamily="2" charset="0"/>
-            </a:endParaRPr>
-          </a:p>
-        </p:txBody>
-      </p:sp>
-      <p:sp>
-        <p:nvSpPr>
-          <p:cNvPr id="3" name="Rectangle 2">
-            <a:extLst>
-              <a:ext uri="{FF2B5EF4-FFF2-40B4-BE49-F238E27FC236}">
-                <a16:creationId xmlns:a16="http://schemas.microsoft.com/office/drawing/2014/main" id="{5BB1680B-3BF8-5B2A-01A9-4AA3C6A2D2F9}"/>
-              </a:ext>
-            </a:extLst>
-          </p:cNvPr>
-          <p:cNvSpPr/>
-          <p:nvPr/>
-        </p:nvSpPr>
-        <p:spPr>
-          <a:xfrm>
-            <a:off x="7857888" y="24301108"/>
-            <a:ext cx="5877879" cy="830997"/>
-          </a:xfrm>
-          <a:prstGeom prst="rect">
-            <a:avLst/>
-          </a:prstGeom>
-        </p:spPr>
-        <p:txBody>
-          <a:bodyPr wrap="square">
-            <a:spAutoFit/>
-          </a:bodyPr>
-          <a:lstStyle/>
-          <a:p>
-            <a:r>
-              <a:rPr lang="en-AU" sz="4800" b="1" dirty="0">
-                <a:solidFill>
-                  <a:srgbClr val="002060"/>
-                </a:solidFill>
-                <a:latin typeface="Oxygen" panose="02000503000000000000" pitchFamily="2" charset="0"/>
-              </a:rPr>
-              <a:t>App Download</a:t>
-            </a:r>
-          </a:p>
-        </p:txBody>
-      </p:sp>
       <p:pic>
         <p:nvPicPr>
-          <p:cNvPr id="6" name="Picture 5">
+          <p:cNvPr id="10" name="Picture 9">
             <a:extLst>
               <a:ext uri="{FF2B5EF4-FFF2-40B4-BE49-F238E27FC236}">
-                <a16:creationId xmlns:a16="http://schemas.microsoft.com/office/drawing/2014/main" id="{A2370A9E-959A-457A-FDB7-69D1E302FA1B}"/>
+                <a16:creationId xmlns:a16="http://schemas.microsoft.com/office/drawing/2014/main" id="{D33FD638-1C52-3BC1-CB7D-EC07BF63562B}"/>
               </a:ext>
             </a:extLst>
           </p:cNvPr>
@@ -3829,7 +3669,106 @@
           <p:nvPr/>
         </p:nvPicPr>
         <p:blipFill>
-          <a:blip r:embed="rId11">
+          <a:blip r:embed="rId10"/>
+          <a:stretch>
+            <a:fillRect/>
+          </a:stretch>
+        </p:blipFill>
+        <p:spPr>
+          <a:xfrm>
+            <a:off x="116437" y="21129138"/>
+            <a:ext cx="9871142" cy="1532660"/>
+          </a:xfrm>
+          <a:prstGeom prst="rect">
+            <a:avLst/>
+          </a:prstGeom>
+        </p:spPr>
+      </p:pic>
+      <p:pic>
+        <p:nvPicPr>
+          <p:cNvPr id="28" name="Picture 27">
+            <a:extLst>
+              <a:ext uri="{FF2B5EF4-FFF2-40B4-BE49-F238E27FC236}">
+                <a16:creationId xmlns:a16="http://schemas.microsoft.com/office/drawing/2014/main" id="{0BD8670C-31E3-728E-D39F-991A4AD5B8D1}"/>
+              </a:ext>
+            </a:extLst>
+          </p:cNvPr>
+          <p:cNvPicPr>
+            <a:picLocks noChangeAspect="1"/>
+          </p:cNvPicPr>
+          <p:nvPr/>
+        </p:nvPicPr>
+        <p:blipFill>
+          <a:blip r:embed="rId11"/>
+          <a:stretch>
+            <a:fillRect/>
+          </a:stretch>
+        </p:blipFill>
+        <p:spPr>
+          <a:xfrm>
+            <a:off x="8484" y="18990922"/>
+            <a:ext cx="8463920" cy="2036285"/>
+          </a:xfrm>
+          <a:prstGeom prst="rect">
+            <a:avLst/>
+          </a:prstGeom>
+        </p:spPr>
+      </p:pic>
+      <p:sp>
+        <p:nvSpPr>
+          <p:cNvPr id="3" name="Rectangle 2">
+            <a:extLst>
+              <a:ext uri="{FF2B5EF4-FFF2-40B4-BE49-F238E27FC236}">
+                <a16:creationId xmlns:a16="http://schemas.microsoft.com/office/drawing/2014/main" id="{5BB1680B-3BF8-5B2A-01A9-4AA3C6A2D2F9}"/>
+              </a:ext>
+            </a:extLst>
+          </p:cNvPr>
+          <p:cNvSpPr/>
+          <p:nvPr/>
+        </p:nvSpPr>
+        <p:spPr>
+          <a:xfrm>
+            <a:off x="13994526" y="22809278"/>
+            <a:ext cx="3465394" cy="646331"/>
+          </a:xfrm>
+          <a:prstGeom prst="rect">
+            <a:avLst/>
+          </a:prstGeom>
+        </p:spPr>
+        <p:txBody>
+          <a:bodyPr wrap="square">
+            <a:spAutoFit/>
+          </a:bodyPr>
+          <a:lstStyle/>
+          <a:p>
+            <a:r>
+              <a:rPr lang="en-AU" sz="3600" b="1" dirty="0">
+                <a:solidFill>
+                  <a:srgbClr val="002060"/>
+                </a:solidFill>
+                <a:latin typeface="Oxygen" panose="02000503000000000000" pitchFamily="2" charset="0"/>
+              </a:rPr>
+              <a:t>App Download</a:t>
+            </a:r>
+          </a:p>
+        </p:txBody>
+      </p:sp>
+      <p:pic>
+        <p:nvPicPr>
+          <p:cNvPr id="6" name="Picture 5">
+            <a:extLst>
+              <a:ext uri="{FF2B5EF4-FFF2-40B4-BE49-F238E27FC236}">
+                <a16:creationId xmlns:a16="http://schemas.microsoft.com/office/drawing/2014/main" id="{A2370A9E-959A-457A-FDB7-69D1E302FA1B}"/>
+              </a:ext>
+            </a:extLst>
+          </p:cNvPr>
+          <p:cNvPicPr>
+            <a:picLocks noChangeAspect="1"/>
+          </p:cNvPicPr>
+          <p:nvPr/>
+        </p:nvPicPr>
+        <p:blipFill>
+          <a:blip r:embed="rId12">
             <a:extLst>
               <a:ext uri="{28A0092B-C50C-407E-A947-70E740481C1C}">
                 <a14:useLocalDpi xmlns:a14="http://schemas.microsoft.com/office/drawing/2010/main" val="0"/>
@@ -3842,8 +3781,8 @@
         </p:blipFill>
         <p:spPr>
           <a:xfrm>
-            <a:off x="3730194" y="22210740"/>
-            <a:ext cx="2378235" cy="2378235"/>
+            <a:off x="11846967" y="21001513"/>
+            <a:ext cx="1786804" cy="1786804"/>
           </a:xfrm>
           <a:prstGeom prst="rect">
             <a:avLst/>
@@ -3864,8 +3803,8 @@
         </p:nvSpPr>
         <p:spPr>
           <a:xfrm>
-            <a:off x="2036612" y="22578711"/>
-            <a:ext cx="1053434" cy="940552"/>
+            <a:off x="10707958" y="21231223"/>
+            <a:ext cx="870606" cy="777315"/>
           </a:xfrm>
           <a:custGeom>
             <a:avLst/>
@@ -4222,7 +4161,7 @@
           <p:nvPr/>
         </p:nvPicPr>
         <p:blipFill>
-          <a:blip r:embed="rId12">
+          <a:blip r:embed="rId13">
             <a:extLst>
               <a:ext uri="{28A0092B-C50C-407E-A947-70E740481C1C}">
                 <a14:useLocalDpi xmlns:a14="http://schemas.microsoft.com/office/drawing/2010/main" val="0"/>
@@ -4236,8 +4175,8 @@
         </p:blipFill>
         <p:spPr bwMode="auto">
           <a:xfrm>
-            <a:off x="7966249" y="23305229"/>
-            <a:ext cx="980670" cy="1099687"/>
+            <a:off x="14258316" y="22046769"/>
+            <a:ext cx="669811" cy="751101"/>
           </a:xfrm>
           <a:prstGeom prst="rect">
             <a:avLst/>
@@ -4254,12 +4193,62 @@
           </a:extLst>
         </p:spPr>
       </p:pic>
+      <p:sp>
+        <p:nvSpPr>
+          <p:cNvPr id="11" name="Rectangle 10">
+            <a:extLst>
+              <a:ext uri="{FF2B5EF4-FFF2-40B4-BE49-F238E27FC236}">
+                <a16:creationId xmlns:a16="http://schemas.microsoft.com/office/drawing/2014/main" id="{E0F8FA35-38E4-02A6-947F-09F5A5E39B02}"/>
+              </a:ext>
+            </a:extLst>
+          </p:cNvPr>
+          <p:cNvSpPr/>
+          <p:nvPr/>
+        </p:nvSpPr>
+        <p:spPr>
+          <a:xfrm>
+            <a:off x="10097078" y="22263878"/>
+            <a:ext cx="3536694" cy="1200329"/>
+          </a:xfrm>
+          <a:prstGeom prst="rect">
+            <a:avLst/>
+          </a:prstGeom>
+        </p:spPr>
+        <p:txBody>
+          <a:bodyPr wrap="square">
+            <a:spAutoFit/>
+          </a:bodyPr>
+          <a:lstStyle/>
+          <a:p>
+            <a:r>
+              <a:rPr lang="en-AU" sz="3600" b="1" dirty="0">
+                <a:solidFill>
+                  <a:srgbClr val="002060"/>
+                </a:solidFill>
+                <a:latin typeface="Oxygen" panose="02000503000000000000" pitchFamily="2" charset="0"/>
+              </a:rPr>
+              <a:t>Follow</a:t>
+            </a:r>
+          </a:p>
+          <a:p>
+            <a:r>
+              <a:rPr lang="en-AU" sz="3600" b="1" dirty="0">
+                <a:solidFill>
+                  <a:srgbClr val="002060"/>
+                </a:solidFill>
+                <a:latin typeface="Oxygen" panose="02000503000000000000" pitchFamily="2" charset="0"/>
+              </a:rPr>
+              <a:t>for Discount</a:t>
+            </a:r>
+          </a:p>
+        </p:txBody>
+      </p:sp>
       <p:pic>
         <p:nvPicPr>
-          <p:cNvPr id="10" name="Picture 9">
+          <p:cNvPr id="12" name="Picture 11">
             <a:extLst>
               <a:ext uri="{FF2B5EF4-FFF2-40B4-BE49-F238E27FC236}">
-                <a16:creationId xmlns:a16="http://schemas.microsoft.com/office/drawing/2014/main" id="{D33FD638-1C52-3BC1-CB7D-EC07BF63562B}"/>
+                <a16:creationId xmlns:a16="http://schemas.microsoft.com/office/drawing/2014/main" id="{BC13B8B1-763B-A9D9-FA68-B1EB187598A0}"/>
               </a:ext>
             </a:extLst>
           </p:cNvPr>
@@ -4269,87 +4258,7 @@
           <p:nvPr/>
         </p:nvPicPr>
         <p:blipFill>
-          <a:blip r:embed="rId13"/>
-          <a:stretch>
-            <a:fillRect/>
-          </a:stretch>
-        </p:blipFill>
-        <p:spPr>
-          <a:xfrm>
-            <a:off x="393316" y="20961153"/>
-            <a:ext cx="8973765" cy="1393327"/>
-          </a:xfrm>
-          <a:prstGeom prst="rect">
-            <a:avLst/>
-          </a:prstGeom>
-        </p:spPr>
-      </p:pic>
-      <p:sp>
-        <p:nvSpPr>
-          <p:cNvPr id="11" name="Rectangle 10">
-            <a:extLst>
-              <a:ext uri="{FF2B5EF4-FFF2-40B4-BE49-F238E27FC236}">
-                <a16:creationId xmlns:a16="http://schemas.microsoft.com/office/drawing/2014/main" id="{E0F8FA35-38E4-02A6-947F-09F5A5E39B02}"/>
-              </a:ext>
-            </a:extLst>
-          </p:cNvPr>
-          <p:cNvSpPr/>
-          <p:nvPr/>
-        </p:nvSpPr>
-        <p:spPr>
-          <a:xfrm>
-            <a:off x="1708925" y="23554111"/>
-            <a:ext cx="5125522" cy="1569660"/>
-          </a:xfrm>
-          <a:prstGeom prst="rect">
-            <a:avLst/>
-          </a:prstGeom>
-        </p:spPr>
-        <p:txBody>
-          <a:bodyPr wrap="square">
-            <a:spAutoFit/>
-          </a:bodyPr>
-          <a:lstStyle/>
-          <a:p>
-            <a:r>
-              <a:rPr lang="en-AU" sz="4800" b="1" dirty="0">
-                <a:solidFill>
-                  <a:srgbClr val="002060"/>
-                </a:solidFill>
-                <a:latin typeface="Oxygen" panose="02000503000000000000" pitchFamily="2" charset="0"/>
-              </a:rPr>
-              <a:t>Follow </a:t>
-            </a:r>
-          </a:p>
-          <a:p>
-            <a:r>
-              <a:rPr lang="en-AU" sz="4800" b="1" dirty="0">
-                <a:solidFill>
-                  <a:srgbClr val="002060"/>
-                </a:solidFill>
-                <a:latin typeface="Oxygen" panose="02000503000000000000" pitchFamily="2" charset="0"/>
-              </a:rPr>
-              <a:t>for Discounts</a:t>
-            </a:r>
-          </a:p>
-        </p:txBody>
-      </p:sp>
-      <p:pic>
-        <p:nvPicPr>
-          <p:cNvPr id="12" name="Picture 11">
-            <a:extLst>
-              <a:ext uri="{FF2B5EF4-FFF2-40B4-BE49-F238E27FC236}">
-                <a16:creationId xmlns:a16="http://schemas.microsoft.com/office/drawing/2014/main" id="{BC13B8B1-763B-A9D9-FA68-B1EB187598A0}"/>
-              </a:ext>
-            </a:extLst>
-          </p:cNvPr>
-          <p:cNvPicPr>
-            <a:picLocks noChangeAspect="1"/>
-          </p:cNvPicPr>
-          <p:nvPr/>
-        </p:nvPicPr>
-        <p:blipFill>
-          <a:blip r:embed="rId7">
+          <a:blip r:embed="rId4">
             <a:extLst>
               <a:ext uri="{28A0092B-C50C-407E-A947-70E740481C1C}">
                 <a14:useLocalDpi xmlns:a14="http://schemas.microsoft.com/office/drawing/2010/main" val="0"/>
@@ -4362,8 +4271,8 @@
         </p:blipFill>
         <p:spPr>
           <a:xfrm>
-            <a:off x="7937569" y="22280465"/>
-            <a:ext cx="980670" cy="927095"/>
+            <a:off x="14207432" y="21024414"/>
+            <a:ext cx="810471" cy="766195"/>
           </a:xfrm>
           <a:prstGeom prst="rect">
             <a:avLst/>
@@ -4398,14 +4307,61 @@
         </p:blipFill>
         <p:spPr>
           <a:xfrm>
-            <a:off x="9873588" y="22210741"/>
-            <a:ext cx="2378235" cy="2378235"/>
+            <a:off x="15367483" y="21001514"/>
+            <a:ext cx="1786804" cy="1786804"/>
           </a:xfrm>
           <a:prstGeom prst="rect">
             <a:avLst/>
           </a:prstGeom>
         </p:spPr>
       </p:pic>
+      <p:pic>
+        <p:nvPicPr>
+          <p:cNvPr id="16" name="Picture 10" descr="New Instagram Logo PNG Images 2023">
+            <a:extLst>
+              <a:ext uri="{FF2B5EF4-FFF2-40B4-BE49-F238E27FC236}">
+                <a16:creationId xmlns:a16="http://schemas.microsoft.com/office/drawing/2014/main" id="{06C25FDB-1D89-1154-DF83-32DBDE994536}"/>
+              </a:ext>
+            </a:extLst>
+          </p:cNvPr>
+          <p:cNvPicPr>
+            <a:picLocks noChangeAspect="1" noChangeArrowheads="1"/>
+          </p:cNvPicPr>
+          <p:nvPr/>
+        </p:nvPicPr>
+        <p:blipFill>
+          <a:blip r:embed="rId15" cstate="print">
+            <a:extLst>
+              <a:ext uri="{28A0092B-C50C-407E-A947-70E740481C1C}">
+                <a14:useLocalDpi xmlns:a14="http://schemas.microsoft.com/office/drawing/2010/main" val="0"/>
+              </a:ext>
+            </a:extLst>
+          </a:blip>
+          <a:srcRect/>
+          <a:stretch>
+            <a:fillRect/>
+          </a:stretch>
+        </p:blipFill>
+        <p:spPr bwMode="auto">
+          <a:xfrm>
+            <a:off x="8299890" y="22398096"/>
+            <a:ext cx="918773" cy="918773"/>
+          </a:xfrm>
+          <a:prstGeom prst="rect">
+            <a:avLst/>
+          </a:prstGeom>
+          <a:noFill/>
+          <a:extLst>
+            <a:ext uri="{909E8E84-426E-40DD-AFC4-6F175D3DCCD1}">
+              <a14:hiddenFill xmlns:a14="http://schemas.microsoft.com/office/drawing/2010/main">
+                <a:solidFill>
+                  <a:srgbClr val="FFFFFF"/>
+                </a:solidFill>
+              </a14:hiddenFill>
+            </a:ext>
+          </a:extLst>
+        </p:spPr>
+      </p:pic>
       <p:sp>
         <p:nvSpPr>
           <p:cNvPr id="15" name="Rectangle 14">
@@ -4420,8 +4376,8 @@
         </p:nvSpPr>
         <p:spPr>
           <a:xfrm>
-            <a:off x="-542" y="34467821"/>
-            <a:ext cx="25603742" cy="1904610"/>
+            <a:off x="-542" y="34972461"/>
+            <a:ext cx="25603742" cy="1399970"/>
           </a:xfrm>
           <a:prstGeom prst="rect">
             <a:avLst/>
@@ -4485,120 +4441,26 @@
           </a:p>
         </p:txBody>
       </p:sp>
-      <p:pic>
-        <p:nvPicPr>
-          <p:cNvPr id="16" name="Picture 10" descr="New Instagram Logo PNG Images 2023">
+      <p:sp>
+        <p:nvSpPr>
+          <p:cNvPr id="25" name="Rectangle 24">
             <a:extLst>
               <a:ext uri="{FF2B5EF4-FFF2-40B4-BE49-F238E27FC236}">
-                <a16:creationId xmlns:a16="http://schemas.microsoft.com/office/drawing/2014/main" id="{06C25FDB-1D89-1154-DF83-32DBDE994536}"/>
+                <a16:creationId xmlns:a16="http://schemas.microsoft.com/office/drawing/2014/main" id="{8C9E3CD1-FD39-8832-ADFA-AEB98F1138AE}"/>
               </a:ext>
             </a:extLst>
           </p:cNvPr>
-          <p:cNvPicPr>
-            <a:picLocks noChangeAspect="1" noChangeArrowheads="1"/>
-          </p:cNvPicPr>
+          <p:cNvSpPr/>
           <p:nvPr/>
-        </p:nvPicPr>
-        <p:blipFill>
-          <a:blip r:embed="rId15" cstate="print">
-            <a:extLst>
-              <a:ext uri="{28A0092B-C50C-407E-A947-70E740481C1C}">
-                <a14:useLocalDpi xmlns:a14="http://schemas.microsoft.com/office/drawing/2010/main" val="0"/>
-              </a:ext>
-            </a:extLst>
-          </a:blip>
-          <a:srcRect/>
-          <a:stretch>
-            <a:fillRect/>
-          </a:stretch>
-        </p:blipFill>
-        <p:spPr bwMode="auto">
-          <a:xfrm>
-            <a:off x="3737124" y="35281376"/>
-            <a:ext cx="918773" cy="918773"/>
+        </p:nvSpPr>
+        <p:spPr>
+          <a:xfrm>
+            <a:off x="5112852" y="35442221"/>
+            <a:ext cx="14214148" cy="830997"/>
           </a:xfrm>
           <a:prstGeom prst="rect">
             <a:avLst/>
           </a:prstGeom>
-          <a:noFill/>
-          <a:extLst>
-            <a:ext uri="{909E8E84-426E-40DD-AFC4-6F175D3DCCD1}">
-              <a14:hiddenFill xmlns:a14="http://schemas.microsoft.com/office/drawing/2010/main">
-                <a:solidFill>
-                  <a:srgbClr val="FFFFFF"/>
-                </a:solidFill>
-              </a14:hiddenFill>
-            </a:ext>
-          </a:extLst>
-        </p:spPr>
-      </p:pic>
-      <p:pic>
-        <p:nvPicPr>
-          <p:cNvPr id="21" name="Picture 16" descr="Linkedin logo png, Linkedin icon transparent png 18930587 PNG">
-            <a:extLst>
-              <a:ext uri="{FF2B5EF4-FFF2-40B4-BE49-F238E27FC236}">
-                <a16:creationId xmlns:a16="http://schemas.microsoft.com/office/drawing/2014/main" id="{5E10E34B-98D7-DB05-FD76-F151712B95EB}"/>
-              </a:ext>
-            </a:extLst>
-          </p:cNvPr>
-          <p:cNvPicPr>
-            <a:picLocks noChangeAspect="1" noChangeArrowheads="1"/>
-          </p:cNvPicPr>
-          <p:nvPr/>
-        </p:nvPicPr>
-        <p:blipFill>
-          <a:blip r:embed="rId16" cstate="print">
-            <a:extLst>
-              <a:ext uri="{28A0092B-C50C-407E-A947-70E740481C1C}">
-                <a14:useLocalDpi xmlns:a14="http://schemas.microsoft.com/office/drawing/2010/main" val="0"/>
-              </a:ext>
-            </a:extLst>
-          </a:blip>
-          <a:srcRect/>
-          <a:stretch>
-            <a:fillRect/>
-          </a:stretch>
-        </p:blipFill>
-        <p:spPr bwMode="auto">
-          <a:xfrm>
-            <a:off x="1065533" y="34938005"/>
-            <a:ext cx="1605516" cy="1605516"/>
-          </a:xfrm>
-          <a:prstGeom prst="rect">
-            <a:avLst/>
-          </a:prstGeom>
-          <a:noFill/>
-          <a:extLst>
-            <a:ext uri="{909E8E84-426E-40DD-AFC4-6F175D3DCCD1}">
-              <a14:hiddenFill xmlns:a14="http://schemas.microsoft.com/office/drawing/2010/main">
-                <a:solidFill>
-                  <a:srgbClr val="FFFFFF"/>
-                </a:solidFill>
-              </a14:hiddenFill>
-            </a:ext>
-          </a:extLst>
-        </p:spPr>
-      </p:pic>
-      <p:sp>
-        <p:nvSpPr>
-          <p:cNvPr id="25" name="Rectangle 24">
-            <a:extLst>
-              <a:ext uri="{FF2B5EF4-FFF2-40B4-BE49-F238E27FC236}">
-                <a16:creationId xmlns:a16="http://schemas.microsoft.com/office/drawing/2014/main" id="{8C9E3CD1-FD39-8832-ADFA-AEB98F1138AE}"/>
-              </a:ext>
-            </a:extLst>
-          </p:cNvPr>
-          <p:cNvSpPr/>
-          <p:nvPr/>
-        </p:nvSpPr>
-        <p:spPr>
-          <a:xfrm>
-            <a:off x="6374261" y="35278281"/>
-            <a:ext cx="17739152" cy="1015663"/>
-          </a:xfrm>
-          <a:prstGeom prst="rect">
-            <a:avLst/>
-          </a:prstGeom>
         </p:spPr>
         <p:txBody>
           <a:bodyPr wrap="none">
@@ -4606,8 +4468,9 @@
           </a:bodyPr>
           <a:lstStyle/>
           <a:p>
-            <a:r>
-              <a:rPr lang="en-US" sz="6000" b="1" dirty="0">
+            <a:pPr algn="ctr"/>
+            <a:r>
+              <a:rPr lang="en-US" sz="4800" b="1" dirty="0">
                 <a:solidFill>
                   <a:srgbClr val="0000FF"/>
                 </a:solidFill>
@@ -4615,7 +4478,7 @@
               </a:rPr>
               <a:t>www.anodiam.com    ||    anirban@anodiam.com</a:t>
             </a:r>
-            <a:endParaRPr lang="en-AU" sz="6000" dirty="0">
+            <a:endParaRPr lang="en-AU" sz="4800" dirty="0">
               <a:solidFill>
                 <a:srgbClr val="0000FF"/>
               </a:solidFill>
@@ -4637,7 +4500,7 @@
         </p:nvSpPr>
         <p:spPr>
           <a:xfrm>
-            <a:off x="70825" y="33404385"/>
+            <a:off x="74617" y="33749472"/>
             <a:ext cx="25603742" cy="1323439"/>
           </a:xfrm>
           <a:prstGeom prst="rect">
@@ -4656,7 +4519,7 @@
               <a:rPr lang="en-US" sz="4000" b="1" cap="small" dirty="0">
                 <a:latin typeface="Oxygen" panose="02000503000000000000" pitchFamily="2" charset="0"/>
               </a:rPr>
-              <a:t>Finest Teachers, Study Materials, Mock Tests, Doubt Clearing, PTM, Counselling</a:t>
+              <a:t>Finest Teachers, Study Mats, Mock Tests, Doubt Clearing, PTM, Counselling, 20 Smart Classrooms,, CCTV</a:t>
             </a:r>
           </a:p>
           <a:p>
@@ -4665,8 +4528,140 @@
               <a:rPr lang="en-US" sz="4000" b="1" cap="small" dirty="0">
                 <a:latin typeface="Oxygen" panose="02000503000000000000" pitchFamily="2" charset="0"/>
               </a:rPr>
-              <a:t>400+ Courses, 20 Smart Classrooms, AC, CCTV</a:t>
-            </a:r>
+              <a:t>400+ Courses, Professional Courses are Proj-Based, Certification Oriented &amp; Career Focused</a:t>
+            </a:r>
+            <a:endParaRPr lang="en-US" sz="4000" dirty="0"/>
+          </a:p>
+        </p:txBody>
+      </p:sp>
+      <p:sp>
+        <p:nvSpPr>
+          <p:cNvPr id="9" name="TextBox 8">
+            <a:extLst>
+              <a:ext uri="{FF2B5EF4-FFF2-40B4-BE49-F238E27FC236}">
+                <a16:creationId xmlns:a16="http://schemas.microsoft.com/office/drawing/2014/main" id="{267C0DB2-B4C0-2633-07D1-4B43BAA8293A}"/>
+              </a:ext>
+            </a:extLst>
+          </p:cNvPr>
+          <p:cNvSpPr txBox="1"/>
+          <p:nvPr/>
+        </p:nvSpPr>
+        <p:spPr>
+          <a:xfrm>
+            <a:off x="-61501" y="24363300"/>
+            <a:ext cx="25681044" cy="9042155"/>
+          </a:xfrm>
+          <a:prstGeom prst="rect">
+            <a:avLst/>
+          </a:prstGeom>
+          <a:noFill/>
+        </p:spPr>
+        <p:txBody>
+          <a:bodyPr wrap="square">
+            <a:spAutoFit/>
+          </a:bodyPr>
+          <a:lstStyle/>
+          <a:p>
+            <a:pPr algn="ctr">
+              <a:lnSpc>
+                <a:spcPct val="150000"/>
+              </a:lnSpc>
+            </a:pPr>
+            <a:r>
+              <a:rPr lang="en-US" sz="6600" b="1" cap="small" dirty="0">
+                <a:solidFill>
+                  <a:srgbClr val="C00000"/>
+                </a:solidFill>
+                <a:latin typeface="Oxygen" panose="02000503000000000000" pitchFamily="2" charset="0"/>
+              </a:rPr>
+              <a:t>ARTIFICIAL INTELLIGENCE – Class III – XII</a:t>
+            </a:r>
+          </a:p>
+          <a:p>
+            <a:pPr algn="ctr">
+              <a:lnSpc>
+                <a:spcPct val="150000"/>
+              </a:lnSpc>
+            </a:pPr>
+            <a:r>
+              <a:rPr lang="en-US" sz="6600" b="1" cap="small" dirty="0">
+                <a:solidFill>
+                  <a:srgbClr val="C00000"/>
+                </a:solidFill>
+                <a:latin typeface="Oxygen" panose="02000503000000000000" pitchFamily="2" charset="0"/>
+              </a:rPr>
+              <a:t>IT &amp; AI Professional Training &amp; Projects</a:t>
+            </a:r>
+          </a:p>
+          <a:p>
+            <a:pPr algn="ctr">
+              <a:lnSpc>
+                <a:spcPct val="150000"/>
+              </a:lnSpc>
+            </a:pPr>
+            <a:r>
+              <a:rPr lang="en-US" sz="6600" b="1" cap="small" dirty="0">
+                <a:solidFill>
+                  <a:srgbClr val="C00000"/>
+                </a:solidFill>
+                <a:latin typeface="Oxygen" panose="02000503000000000000" pitchFamily="2" charset="0"/>
+              </a:rPr>
+              <a:t>VIII-XII - All Subjects &amp; Boards</a:t>
+            </a:r>
+          </a:p>
+          <a:p>
+            <a:pPr algn="ctr">
+              <a:lnSpc>
+                <a:spcPct val="150000"/>
+              </a:lnSpc>
+            </a:pPr>
+            <a:r>
+              <a:rPr lang="en-US" sz="6600" b="1" cap="small" dirty="0">
+                <a:solidFill>
+                  <a:srgbClr val="C00000"/>
+                </a:solidFill>
+                <a:latin typeface="Oxygen" panose="02000503000000000000" pitchFamily="2" charset="0"/>
+              </a:rPr>
+              <a:t>NEET, IIT-JEE (Mains &amp; Advanced)</a:t>
+            </a:r>
+          </a:p>
+          <a:p>
+            <a:pPr algn="ctr">
+              <a:lnSpc>
+                <a:spcPct val="150000"/>
+              </a:lnSpc>
+            </a:pPr>
+            <a:r>
+              <a:rPr lang="en-US" sz="6600" b="1" cap="small" dirty="0">
+                <a:solidFill>
+                  <a:srgbClr val="C00000"/>
+                </a:solidFill>
+                <a:latin typeface="Oxygen" panose="02000503000000000000" pitchFamily="2" charset="0"/>
+              </a:rPr>
+              <a:t>BCom, BBA, CA, CMA, CS, CFA, CLAT, LLB, LLM</a:t>
+            </a:r>
+          </a:p>
+          <a:p>
+            <a:pPr algn="ctr">
+              <a:lnSpc>
+                <a:spcPct val="150000"/>
+              </a:lnSpc>
+            </a:pPr>
+            <a:r>
+              <a:rPr lang="en-US" sz="6600" b="1" cap="small" dirty="0">
+                <a:solidFill>
+                  <a:srgbClr val="C00000"/>
+                </a:solidFill>
+                <a:latin typeface="Oxygen" panose="02000503000000000000" pitchFamily="2" charset="0"/>
+              </a:rPr>
+              <a:t>Grooming, IELTS, TOEFL, Foreign Languages</a:t>
+            </a:r>
+            <a:endParaRPr lang="en-US" sz="8800" b="1" cap="small" dirty="0">
+              <a:solidFill>
+                <a:srgbClr val="C00000"/>
+              </a:solidFill>
+              <a:latin typeface="Oxygen" panose="02000503000000000000" pitchFamily="2" charset="0"/>
+            </a:endParaRPr>
           </a:p>
         </p:txBody>
       </p:sp>
@@ -4722,7 +4717,7 @@
         </p:blipFill>
         <p:spPr>
           <a:xfrm>
-            <a:off x="6939" y="18428"/>
+            <a:off x="6939" y="-4579"/>
             <a:ext cx="25603742" cy="24718388"/>
           </a:xfrm>
           <a:prstGeom prst="rect">
@@ -4758,7 +4753,7 @@
         </p:blipFill>
         <p:spPr>
           <a:xfrm>
-            <a:off x="12604629" y="9540344"/>
+            <a:off x="12599071" y="7932190"/>
             <a:ext cx="13006052" cy="19304211"/>
           </a:xfrm>
           <a:prstGeom prst="rect">
@@ -4794,8 +4789,8 @@
         </p:blipFill>
         <p:spPr>
           <a:xfrm>
-            <a:off x="3237714" y="553365"/>
-            <a:ext cx="19106561" cy="9280333"/>
+            <a:off x="7398417" y="770599"/>
+            <a:ext cx="10785155" cy="5238505"/>
           </a:xfrm>
           <a:prstGeom prst="rect">
             <a:avLst/>
@@ -4804,10 +4799,10 @@
       </p:pic>
       <p:sp>
         <p:nvSpPr>
-          <p:cNvPr id="39" name="TextBox 38">
+          <p:cNvPr id="9" name="TextBox 8">
             <a:extLst>
               <a:ext uri="{FF2B5EF4-FFF2-40B4-BE49-F238E27FC236}">
-                <a16:creationId xmlns:a16="http://schemas.microsoft.com/office/drawing/2014/main" id="{F71474C8-D56F-A009-1E43-209F024854AC}"/>
+                <a16:creationId xmlns:a16="http://schemas.microsoft.com/office/drawing/2014/main" id="{73DE5647-C12E-8EF5-1A18-A68201A4E5DA}"/>
               </a:ext>
             </a:extLst>
           </p:cNvPr>
@@ -4816,8 +4811,8 @@
         </p:nvSpPr>
         <p:spPr>
           <a:xfrm>
-            <a:off x="3298480" y="11231900"/>
-            <a:ext cx="19106561" cy="1846659"/>
+            <a:off x="2943605" y="6080286"/>
+            <a:ext cx="18552642" cy="1446550"/>
           </a:xfrm>
           <a:prstGeom prst="rect">
             <a:avLst/>
@@ -4825,12 +4820,227 @@
           <a:noFill/>
         </p:spPr>
         <p:txBody>
+          <a:bodyPr wrap="square" rtlCol="0">
+            <a:spAutoFit/>
+          </a:bodyPr>
+          <a:lstStyle/>
+          <a:p>
+            <a:pPr algn="ctr"/>
+            <a:r>
+              <a:rPr lang="en-US" sz="8800" b="1" cap="small" dirty="0">
+                <a:ln w="6600">
+                  <a:solidFill>
+                    <a:srgbClr val="C00000"/>
+                  </a:solidFill>
+                  <a:prstDash val="solid"/>
+                </a:ln>
+                <a:solidFill>
+                  <a:srgbClr val="C00000"/>
+                </a:solidFill>
+                <a:effectLst>
+                  <a:glow>
+                    <a:srgbClr val="C00000">
+                      <a:alpha val="40000"/>
+                    </a:srgbClr>
+                  </a:glow>
+                  <a:outerShdw dist="38100" dir="5400000" sy="-20000" rotWithShape="0">
+                    <a:prstClr val="black">
+                      <a:alpha val="0"/>
+                    </a:prstClr>
+                  </a:outerShdw>
+                </a:effectLst>
+                <a:latin typeface="Oxygen" panose="02000503000000000000" pitchFamily="2" charset="0"/>
+              </a:rPr>
+              <a:t>Artificial Intelligence &amp; IT Training</a:t>
+            </a:r>
+            <a:endParaRPr lang="en-AU" sz="8800" b="1" cap="small" dirty="0">
+              <a:ln w="6600">
+                <a:solidFill>
+                  <a:srgbClr val="C00000"/>
+                </a:solidFill>
+                <a:prstDash val="solid"/>
+              </a:ln>
+              <a:solidFill>
+                <a:srgbClr val="C00000"/>
+              </a:solidFill>
+              <a:effectLst>
+                <a:glow>
+                  <a:srgbClr val="C00000">
+                    <a:alpha val="40000"/>
+                  </a:srgbClr>
+                </a:glow>
+                <a:outerShdw dist="38100" dir="5400000" sy="-20000" rotWithShape="0">
+                  <a:prstClr val="black">
+                    <a:alpha val="0"/>
+                  </a:prstClr>
+                </a:outerShdw>
+              </a:effectLst>
+              <a:latin typeface="Oxygen" panose="02000503000000000000" pitchFamily="2" charset="0"/>
+            </a:endParaRPr>
+          </a:p>
+        </p:txBody>
+      </p:sp>
+      <p:sp>
+        <p:nvSpPr>
+          <p:cNvPr id="21" name="TextBox 20">
+            <a:extLst>
+              <a:ext uri="{FF2B5EF4-FFF2-40B4-BE49-F238E27FC236}">
+                <a16:creationId xmlns:a16="http://schemas.microsoft.com/office/drawing/2014/main" id="{C6AAAEC9-DA7E-6646-4269-5C91057745FD}"/>
+              </a:ext>
+            </a:extLst>
+          </p:cNvPr>
+          <p:cNvSpPr txBox="1"/>
+          <p:nvPr/>
+        </p:nvSpPr>
+        <p:spPr>
+          <a:xfrm>
+            <a:off x="749149" y="7717944"/>
+            <a:ext cx="17399501" cy="923330"/>
+          </a:xfrm>
+          <a:prstGeom prst="rect">
+            <a:avLst/>
+          </a:prstGeom>
+          <a:noFill/>
+        </p:spPr>
+        <p:txBody>
           <a:bodyPr wrap="square">
             <a:spAutoFit/>
           </a:bodyPr>
           <a:lstStyle/>
           <a:p>
-            <a:pPr algn="ctr"/>
+            <a:r>
+              <a:rPr lang="en-US" sz="5400" b="1" cap="small" dirty="0">
+                <a:ln w="6600">
+                  <a:solidFill>
+                    <a:srgbClr val="C00000"/>
+                  </a:solidFill>
+                  <a:prstDash val="solid"/>
+                </a:ln>
+                <a:solidFill>
+                  <a:srgbClr val="C00000"/>
+                </a:solidFill>
+                <a:effectLst>
+                  <a:glow>
+                    <a:srgbClr val="C00000">
+                      <a:alpha val="40000"/>
+                    </a:srgbClr>
+                  </a:glow>
+                  <a:outerShdw dist="38100" dir="5400000" sy="-20000" rotWithShape="0">
+                    <a:prstClr val="black">
+                      <a:alpha val="0"/>
+                    </a:prstClr>
+                  </a:outerShdw>
+                </a:effectLst>
+                <a:latin typeface="Oxygen" panose="02000503000000000000" pitchFamily="2" charset="0"/>
+              </a:rPr>
+              <a:t>N-1/25 Patuli, Kol 94, Near Fire Brigade &amp; Krisi Vikas</a:t>
+            </a:r>
+            <a:endParaRPr lang="en-US" sz="6600" b="1" cap="small" dirty="0">
+              <a:ln w="6600">
+                <a:solidFill>
+                  <a:srgbClr val="C00000"/>
+                </a:solidFill>
+                <a:prstDash val="solid"/>
+              </a:ln>
+              <a:solidFill>
+                <a:srgbClr val="C00000"/>
+              </a:solidFill>
+              <a:effectLst>
+                <a:glow>
+                  <a:srgbClr val="C00000">
+                    <a:alpha val="40000"/>
+                  </a:srgbClr>
+                </a:glow>
+                <a:outerShdw dist="38100" dir="5400000" sy="-20000" rotWithShape="0">
+                  <a:prstClr val="black">
+                    <a:alpha val="0"/>
+                  </a:prstClr>
+                </a:outerShdw>
+              </a:effectLst>
+              <a:latin typeface="Oxygen" panose="02000503000000000000" pitchFamily="2" charset="0"/>
+            </a:endParaRPr>
+          </a:p>
+        </p:txBody>
+      </p:sp>
+      <p:pic>
+        <p:nvPicPr>
+          <p:cNvPr id="24" name="Picture 14" descr="Whatsapp Icon PNGs for Free Download">
+            <a:extLst>
+              <a:ext uri="{FF2B5EF4-FFF2-40B4-BE49-F238E27FC236}">
+                <a16:creationId xmlns:a16="http://schemas.microsoft.com/office/drawing/2014/main" id="{B12EDB4B-AD12-0672-41A3-A9D3F3ADD119}"/>
+              </a:ext>
+            </a:extLst>
+          </p:cNvPr>
+          <p:cNvPicPr>
+            <a:picLocks noChangeAspect="1" noChangeArrowheads="1"/>
+          </p:cNvPicPr>
+          <p:nvPr/>
+        </p:nvPicPr>
+        <p:blipFill>
+          <a:blip r:embed="rId5" cstate="print">
+            <a:extLst>
+              <a:ext uri="{28A0092B-C50C-407E-A947-70E740481C1C}">
+                <a14:useLocalDpi xmlns:a14="http://schemas.microsoft.com/office/drawing/2010/main" val="0"/>
+              </a:ext>
+            </a:extLst>
+          </a:blip>
+          <a:srcRect/>
+          <a:stretch>
+            <a:fillRect/>
+          </a:stretch>
+        </p:blipFill>
+        <p:spPr bwMode="auto">
+          <a:xfrm>
+            <a:off x="23880971" y="7655874"/>
+            <a:ext cx="1046991" cy="1046991"/>
+          </a:xfrm>
+          <a:prstGeom prst="rect">
+            <a:avLst/>
+          </a:prstGeom>
+          <a:noFill/>
+          <a:extLst>
+            <a:ext uri="{909E8E84-426E-40DD-AFC4-6F175D3DCCD1}">
+              <a14:hiddenFill xmlns:a14="http://schemas.microsoft.com/office/drawing/2010/main">
+                <a:solidFill>
+                  <a:srgbClr val="FFFFFF"/>
+                </a:solidFill>
+              </a14:hiddenFill>
+            </a:ext>
+          </a:extLst>
+        </p:spPr>
+      </p:pic>
+      <p:sp>
+        <p:nvSpPr>
+          <p:cNvPr id="29" name="Rectangle 28">
+            <a:extLst>
+              <a:ext uri="{FF2B5EF4-FFF2-40B4-BE49-F238E27FC236}">
+                <a16:creationId xmlns:a16="http://schemas.microsoft.com/office/drawing/2014/main" id="{28F90B1F-14FD-4442-5ED3-CF21B200204C}"/>
+              </a:ext>
+            </a:extLst>
+          </p:cNvPr>
+          <p:cNvSpPr/>
+          <p:nvPr/>
+        </p:nvSpPr>
+        <p:spPr>
+          <a:xfrm>
+            <a:off x="18890860" y="7357221"/>
+            <a:ext cx="4984553" cy="1303562"/>
+          </a:xfrm>
+          <a:prstGeom prst="rect">
+            <a:avLst/>
+          </a:prstGeom>
+        </p:spPr>
+        <p:txBody>
+          <a:bodyPr wrap="square">
+            <a:spAutoFit/>
+          </a:bodyPr>
+          <a:lstStyle/>
+          <a:p>
+            <a:pPr algn="ctr">
+              <a:lnSpc>
+                <a:spcPct val="150000"/>
+              </a:lnSpc>
+            </a:pPr>
             <a:r>
               <a:rPr lang="en-US" sz="6000" b="1" cap="small" dirty="0">
                 <a:ln w="6600">
@@ -4856,62 +5066,423 @@
                 </a:effectLst>
                 <a:latin typeface="Oxygen" panose="02000503000000000000" pitchFamily="2" charset="0"/>
               </a:rPr>
-              <a:t>N-1/25 Patuli, Kol 94</a:t>
-            </a:r>
-          </a:p>
-          <a:p>
-            <a:pPr algn="ctr"/>
-            <a:r>
-              <a:rPr lang="en-US" sz="5400" b="1" cap="small" dirty="0">
-                <a:ln w="6600">
-                  <a:solidFill>
-                    <a:srgbClr val="C00000"/>
-                  </a:solidFill>
-                  <a:prstDash val="solid"/>
-                </a:ln>
+              <a:t>9073 700094</a:t>
+            </a:r>
+            <a:endParaRPr lang="en-AU" sz="6000" b="1" cap="small" dirty="0">
+              <a:ln w="6600">
                 <a:solidFill>
                   <a:srgbClr val="C00000"/>
                 </a:solidFill>
-                <a:effectLst>
-                  <a:glow>
-                    <a:srgbClr val="C00000">
-                      <a:alpha val="40000"/>
-                    </a:srgbClr>
-                  </a:glow>
-                  <a:outerShdw dist="38100" dir="5400000" sy="-20000" rotWithShape="0">
-                    <a:prstClr val="black">
-                      <a:alpha val="0"/>
-                    </a:prstClr>
-                  </a:outerShdw>
-                </a:effectLst>
-                <a:latin typeface="Oxygen" panose="02000503000000000000" pitchFamily="2" charset="0"/>
-              </a:rPr>
-              <a:t>Near Fire Brigade &amp; Krisi Vikas</a:t>
-            </a:r>
-          </a:p>
-        </p:txBody>
-      </p:sp>
-      <p:sp>
-        <p:nvSpPr>
-          <p:cNvPr id="49" name="TextBox 48">
+                <a:prstDash val="solid"/>
+              </a:ln>
+              <a:solidFill>
+                <a:srgbClr val="C00000"/>
+              </a:solidFill>
+              <a:effectLst>
+                <a:glow>
+                  <a:srgbClr val="C00000">
+                    <a:alpha val="40000"/>
+                  </a:srgbClr>
+                </a:glow>
+                <a:outerShdw dist="38100" dir="5400000" sy="-20000" rotWithShape="0">
+                  <a:prstClr val="black">
+                    <a:alpha val="0"/>
+                  </a:prstClr>
+                </a:outerShdw>
+              </a:effectLst>
+              <a:latin typeface="Oxygen" panose="02000503000000000000" pitchFamily="2" charset="0"/>
+            </a:endParaRPr>
+          </a:p>
+        </p:txBody>
+      </p:sp>
+      <p:pic>
+        <p:nvPicPr>
+          <p:cNvPr id="32" name="Picture 18" descr="Page 2 | Phone Icon Png Images - Free Download on Freepik">
             <a:extLst>
               <a:ext uri="{FF2B5EF4-FFF2-40B4-BE49-F238E27FC236}">
-                <a16:creationId xmlns:a16="http://schemas.microsoft.com/office/drawing/2014/main" id="{A78A26A3-6E03-D16E-D6B2-4CE07FC77059}"/>
+                <a16:creationId xmlns:a16="http://schemas.microsoft.com/office/drawing/2014/main" id="{E46C82D5-D97E-E337-EBA7-D81A22415AFF}"/>
               </a:ext>
             </a:extLst>
           </p:cNvPr>
-          <p:cNvSpPr txBox="1"/>
+          <p:cNvPicPr>
+            <a:picLocks noChangeAspect="1" noChangeArrowheads="1"/>
+          </p:cNvPicPr>
           <p:nvPr/>
-        </p:nvSpPr>
-        <p:spPr>
-          <a:xfrm>
-            <a:off x="-65414" y="33454453"/>
-            <a:ext cx="25603742" cy="1323439"/>
+        </p:nvPicPr>
+        <p:blipFill>
+          <a:blip r:embed="rId6" cstate="print">
+            <a:extLst>
+              <a:ext uri="{28A0092B-C50C-407E-A947-70E740481C1C}">
+                <a14:useLocalDpi xmlns:a14="http://schemas.microsoft.com/office/drawing/2010/main" val="0"/>
+              </a:ext>
+            </a:extLst>
+          </a:blip>
+          <a:srcRect/>
+          <a:stretch>
+            <a:fillRect/>
+          </a:stretch>
+        </p:blipFill>
+        <p:spPr bwMode="auto">
+          <a:xfrm>
+            <a:off x="17928472" y="7701349"/>
+            <a:ext cx="964851" cy="964851"/>
           </a:xfrm>
           <a:prstGeom prst="rect">
             <a:avLst/>
           </a:prstGeom>
           <a:noFill/>
+          <a:extLst>
+            <a:ext uri="{909E8E84-426E-40DD-AFC4-6F175D3DCCD1}">
+              <a14:hiddenFill xmlns:a14="http://schemas.microsoft.com/office/drawing/2010/main">
+                <a:solidFill>
+                  <a:srgbClr val="FFFFFF"/>
+                </a:solidFill>
+              </a14:hiddenFill>
+            </a:ext>
+          </a:extLst>
+        </p:spPr>
+      </p:pic>
+      <p:sp>
+        <p:nvSpPr>
+          <p:cNvPr id="2" name="32-Point Star 20">
+            <a:extLst>
+              <a:ext uri="{FF2B5EF4-FFF2-40B4-BE49-F238E27FC236}">
+                <a16:creationId xmlns:a16="http://schemas.microsoft.com/office/drawing/2014/main" id="{D03A4655-CF42-FFDB-DEAD-31C34A397D60}"/>
+              </a:ext>
+            </a:extLst>
+          </p:cNvPr>
+          <p:cNvSpPr/>
+          <p:nvPr/>
+        </p:nvSpPr>
+        <p:spPr>
+          <a:xfrm rot="21243013">
+            <a:off x="7756438" y="9049687"/>
+            <a:ext cx="10815524" cy="6012258"/>
+          </a:xfrm>
+          <a:prstGeom prst="star32">
+            <a:avLst/>
+          </a:prstGeom>
+          <a:solidFill>
+            <a:srgbClr val="FF0000"/>
+          </a:solidFill>
+          <a:ln w="254000">
+            <a:solidFill>
+              <a:srgbClr val="0066FF"/>
+            </a:solidFill>
+          </a:ln>
+        </p:spPr>
+        <p:style>
+          <a:lnRef idx="2">
+            <a:schemeClr val="accent1">
+              <a:shade val="50000"/>
+            </a:schemeClr>
+          </a:lnRef>
+          <a:fillRef idx="1">
+            <a:schemeClr val="accent1"/>
+          </a:fillRef>
+          <a:effectRef idx="0">
+            <a:schemeClr val="accent1"/>
+          </a:effectRef>
+          <a:fontRef idx="minor">
+            <a:schemeClr val="lt1"/>
+          </a:fontRef>
+        </p:style>
+        <p:txBody>
+          <a:bodyPr rtlCol="0" anchor="ctr"/>
+          <a:lstStyle/>
+          <a:p>
+            <a:pPr algn="ctr"/>
+            <a:r>
+              <a:rPr lang="en-US" sz="4400" b="1" cap="small" dirty="0">
+                <a:solidFill>
+                  <a:schemeClr val="bg1"/>
+                </a:solidFill>
+                <a:latin typeface="Oxygen" panose="02000503000000000000" pitchFamily="2" charset="0"/>
+              </a:rPr>
+              <a:t>Upto</a:t>
+            </a:r>
+            <a:r>
+              <a:rPr lang="en-US" sz="3200" b="1" cap="small" dirty="0">
+                <a:solidFill>
+                  <a:schemeClr val="bg1"/>
+                </a:solidFill>
+                <a:latin typeface="Oxygen" panose="02000503000000000000" pitchFamily="2" charset="0"/>
+              </a:rPr>
+              <a:t> </a:t>
+            </a:r>
+            <a:r>
+              <a:rPr lang="en-US" sz="11600" b="1" cap="small" dirty="0">
+                <a:solidFill>
+                  <a:schemeClr val="bg1"/>
+                </a:solidFill>
+                <a:latin typeface="Oxygen" panose="02000503000000000000" pitchFamily="2" charset="0"/>
+              </a:rPr>
+              <a:t>50%</a:t>
+            </a:r>
+            <a:r>
+              <a:rPr lang="en-US" sz="3200" b="1" cap="small" dirty="0">
+                <a:solidFill>
+                  <a:schemeClr val="bg1"/>
+                </a:solidFill>
+                <a:latin typeface="Oxygen" panose="02000503000000000000" pitchFamily="2" charset="0"/>
+              </a:rPr>
+              <a:t> </a:t>
+            </a:r>
+            <a:r>
+              <a:rPr lang="en-US" sz="4400" b="1" cap="small" dirty="0">
+                <a:solidFill>
+                  <a:schemeClr val="bg1"/>
+                </a:solidFill>
+                <a:latin typeface="Oxygen" panose="02000503000000000000" pitchFamily="2" charset="0"/>
+              </a:rPr>
+              <a:t>Off</a:t>
+            </a:r>
+            <a:r>
+              <a:rPr lang="en-US" sz="6000" b="1" cap="small" dirty="0">
+                <a:solidFill>
+                  <a:schemeClr val="bg1"/>
+                </a:solidFill>
+                <a:latin typeface="Oxygen" panose="02000503000000000000" pitchFamily="2" charset="0"/>
+              </a:rPr>
+              <a:t> </a:t>
+            </a:r>
+          </a:p>
+          <a:p>
+            <a:pPr algn="ctr"/>
+            <a:r>
+              <a:rPr lang="en-US" sz="4400" b="1" cap="small" dirty="0">
+                <a:solidFill>
+                  <a:schemeClr val="bg1"/>
+                </a:solidFill>
+                <a:latin typeface="Oxygen" panose="02000503000000000000" pitchFamily="2" charset="0"/>
+              </a:rPr>
+              <a:t>T&amp;C Apply</a:t>
+            </a:r>
+            <a:endParaRPr lang="en-US" sz="2800" b="1" cap="small" dirty="0">
+              <a:solidFill>
+                <a:schemeClr val="bg1"/>
+              </a:solidFill>
+              <a:latin typeface="Oxygen" panose="02000503000000000000" pitchFamily="2" charset="0"/>
+            </a:endParaRPr>
+          </a:p>
+        </p:txBody>
+      </p:sp>
+      <p:pic>
+        <p:nvPicPr>
+          <p:cNvPr id="5" name="Picture 4">
+            <a:extLst>
+              <a:ext uri="{FF2B5EF4-FFF2-40B4-BE49-F238E27FC236}">
+                <a16:creationId xmlns:a16="http://schemas.microsoft.com/office/drawing/2014/main" id="{96537DC9-7001-ABB5-CEC5-641A9889A363}"/>
+              </a:ext>
+            </a:extLst>
+          </p:cNvPr>
+          <p:cNvPicPr>
+            <a:picLocks noChangeAspect="1"/>
+          </p:cNvPicPr>
+          <p:nvPr/>
+        </p:nvPicPr>
+        <p:blipFill>
+          <a:blip r:embed="rId7">
+            <a:extLst>
+              <a:ext uri="{28A0092B-C50C-407E-A947-70E740481C1C}">
+                <a14:useLocalDpi xmlns:a14="http://schemas.microsoft.com/office/drawing/2010/main" val="0"/>
+              </a:ext>
+            </a:extLst>
+          </a:blip>
+          <a:stretch>
+            <a:fillRect/>
+          </a:stretch>
+        </p:blipFill>
+        <p:spPr>
+          <a:xfrm>
+            <a:off x="129737" y="9170408"/>
+            <a:ext cx="10567652" cy="13672954"/>
+          </a:xfrm>
+          <a:prstGeom prst="rect">
+            <a:avLst/>
+          </a:prstGeom>
+        </p:spPr>
+      </p:pic>
+      <p:pic>
+        <p:nvPicPr>
+          <p:cNvPr id="17" name="Picture 16">
+            <a:extLst>
+              <a:ext uri="{FF2B5EF4-FFF2-40B4-BE49-F238E27FC236}">
+                <a16:creationId xmlns:a16="http://schemas.microsoft.com/office/drawing/2014/main" id="{2A88CD58-A345-2D82-B535-B54DF3C15F5C}"/>
+              </a:ext>
+            </a:extLst>
+          </p:cNvPr>
+          <p:cNvPicPr>
+            <a:picLocks noChangeAspect="1"/>
+          </p:cNvPicPr>
+          <p:nvPr/>
+        </p:nvPicPr>
+        <p:blipFill>
+          <a:blip r:embed="rId8">
+            <a:extLst>
+              <a:ext uri="{28A0092B-C50C-407E-A947-70E740481C1C}">
+                <a14:useLocalDpi xmlns:a14="http://schemas.microsoft.com/office/drawing/2010/main" val="0"/>
+              </a:ext>
+            </a:extLst>
+          </a:blip>
+          <a:stretch>
+            <a:fillRect/>
+          </a:stretch>
+        </p:blipFill>
+        <p:spPr>
+          <a:xfrm rot="21440353">
+            <a:off x="14522874" y="16214797"/>
+            <a:ext cx="1197356" cy="1131942"/>
+          </a:xfrm>
+          <a:prstGeom prst="rect">
+            <a:avLst/>
+          </a:prstGeom>
+        </p:spPr>
+      </p:pic>
+      <p:pic>
+        <p:nvPicPr>
+          <p:cNvPr id="39" name="Picture 38">
+            <a:extLst>
+              <a:ext uri="{FF2B5EF4-FFF2-40B4-BE49-F238E27FC236}">
+                <a16:creationId xmlns:a16="http://schemas.microsoft.com/office/drawing/2014/main" id="{C1B64696-058F-5644-A6D0-3775FF215EEB}"/>
+              </a:ext>
+            </a:extLst>
+          </p:cNvPr>
+          <p:cNvPicPr>
+            <a:picLocks noChangeAspect="1"/>
+          </p:cNvPicPr>
+          <p:nvPr/>
+        </p:nvPicPr>
+        <p:blipFill>
+          <a:blip r:embed="rId9">
+            <a:extLst>
+              <a:ext uri="{28A0092B-C50C-407E-A947-70E740481C1C}">
+                <a14:useLocalDpi xmlns:a14="http://schemas.microsoft.com/office/drawing/2010/main" val="0"/>
+              </a:ext>
+            </a:extLst>
+          </a:blip>
+          <a:stretch>
+            <a:fillRect/>
+          </a:stretch>
+        </p:blipFill>
+        <p:spPr>
+          <a:xfrm>
+            <a:off x="4768939" y="13680601"/>
+            <a:ext cx="9862786" cy="7209396"/>
+          </a:xfrm>
+          <a:prstGeom prst="rect">
+            <a:avLst/>
+          </a:prstGeom>
+        </p:spPr>
+      </p:pic>
+      <p:pic>
+        <p:nvPicPr>
+          <p:cNvPr id="18" name="Picture 17">
+            <a:extLst>
+              <a:ext uri="{FF2B5EF4-FFF2-40B4-BE49-F238E27FC236}">
+                <a16:creationId xmlns:a16="http://schemas.microsoft.com/office/drawing/2014/main" id="{EBDA50B9-AAE0-AEE4-5282-40372DB416AD}"/>
+              </a:ext>
+            </a:extLst>
+          </p:cNvPr>
+          <p:cNvPicPr>
+            <a:picLocks noChangeAspect="1"/>
+          </p:cNvPicPr>
+          <p:nvPr/>
+        </p:nvPicPr>
+        <p:blipFill>
+          <a:blip r:embed="rId10">
+            <a:extLst>
+              <a:ext uri="{28A0092B-C50C-407E-A947-70E740481C1C}">
+                <a14:useLocalDpi xmlns:a14="http://schemas.microsoft.com/office/drawing/2010/main" val="0"/>
+              </a:ext>
+            </a:extLst>
+          </a:blip>
+          <a:stretch>
+            <a:fillRect/>
+          </a:stretch>
+        </p:blipFill>
+        <p:spPr>
+          <a:xfrm>
+            <a:off x="80013" y="13779409"/>
+            <a:ext cx="5163468" cy="7374615"/>
+          </a:xfrm>
+          <a:prstGeom prst="rect">
+            <a:avLst/>
+          </a:prstGeom>
+        </p:spPr>
+      </p:pic>
+      <p:sp>
+        <p:nvSpPr>
+          <p:cNvPr id="22" name="Rectangle 21">
+            <a:extLst>
+              <a:ext uri="{FF2B5EF4-FFF2-40B4-BE49-F238E27FC236}">
+                <a16:creationId xmlns:a16="http://schemas.microsoft.com/office/drawing/2014/main" id="{BF1947EF-B294-98B3-67D8-8C8A26F971AF}"/>
+              </a:ext>
+            </a:extLst>
+          </p:cNvPr>
+          <p:cNvSpPr/>
+          <p:nvPr/>
+        </p:nvSpPr>
+        <p:spPr>
+          <a:xfrm>
+            <a:off x="-7481" y="20795131"/>
+            <a:ext cx="14345754" cy="15305157"/>
+          </a:xfrm>
+          <a:prstGeom prst="rect">
+            <a:avLst/>
+          </a:prstGeom>
+          <a:solidFill>
+            <a:schemeClr val="bg1"/>
+          </a:solidFill>
+          <a:ln>
+            <a:noFill/>
+          </a:ln>
+        </p:spPr>
+        <p:style>
+          <a:lnRef idx="2">
+            <a:schemeClr val="accent1">
+              <a:shade val="15000"/>
+            </a:schemeClr>
+          </a:lnRef>
+          <a:fillRef idx="1">
+            <a:schemeClr val="accent1"/>
+          </a:fillRef>
+          <a:effectRef idx="0">
+            <a:schemeClr val="accent1"/>
+          </a:effectRef>
+          <a:fontRef idx="minor">
+            <a:schemeClr val="lt1"/>
+          </a:fontRef>
+        </p:style>
+        <p:txBody>
+          <a:bodyPr rtlCol="0" anchor="ctr"/>
+          <a:lstStyle/>
+          <a:p>
+            <a:pPr algn="ctr"/>
+            <a:endParaRPr lang="en-US"/>
+          </a:p>
+        </p:txBody>
+      </p:sp>
+      <p:sp>
+        <p:nvSpPr>
+          <p:cNvPr id="3" name="Rectangle 2">
+            <a:extLst>
+              <a:ext uri="{FF2B5EF4-FFF2-40B4-BE49-F238E27FC236}">
+                <a16:creationId xmlns:a16="http://schemas.microsoft.com/office/drawing/2014/main" id="{5BB1680B-3BF8-5B2A-01A9-4AA3C6A2D2F9}"/>
+              </a:ext>
+            </a:extLst>
+          </p:cNvPr>
+          <p:cNvSpPr/>
+          <p:nvPr/>
+        </p:nvSpPr>
+        <p:spPr>
+          <a:xfrm>
+            <a:off x="13994526" y="22809278"/>
+            <a:ext cx="3465394" cy="646331"/>
+          </a:xfrm>
+          <a:prstGeom prst="rect">
+            <a:avLst/>
+          </a:prstGeom>
         </p:spPr>
         <p:txBody>
           <a:bodyPr wrap="square">
@@ -4919,90 +5490,143 @@
           </a:bodyPr>
           <a:lstStyle/>
           <a:p>
-            <a:pPr algn="ctr"/>
-            <a:r>
-              <a:rPr lang="en-US" sz="4000" b="1" cap="small" dirty="0">
+            <a:r>
+              <a:rPr lang="en-AU" sz="3600" b="1" dirty="0">
+                <a:solidFill>
+                  <a:srgbClr val="002060"/>
+                </a:solidFill>
                 <a:latin typeface="Oxygen" panose="02000503000000000000" pitchFamily="2" charset="0"/>
               </a:rPr>
-              <a:t>Globally experienced faculty from prestigious organizations, fun &amp; easy learning</a:t>
-            </a:r>
-          </a:p>
-          <a:p>
-            <a:pPr algn="ctr"/>
-            <a:r>
-              <a:rPr lang="en-US" sz="4000" b="1" cap="small" dirty="0">
-                <a:latin typeface="Oxygen" panose="02000503000000000000" pitchFamily="2" charset="0"/>
-              </a:rPr>
-              <a:t>Project based, Career Focused, Certification Help, Smart Classrooms, AC, CCTV</a:t>
-            </a:r>
-          </a:p>
-        </p:txBody>
-      </p:sp>
-      <p:sp>
-        <p:nvSpPr>
-          <p:cNvPr id="3" name="TextBox 2">
+              <a:t>App Download</a:t>
+            </a:r>
+          </a:p>
+        </p:txBody>
+      </p:sp>
+      <p:pic>
+        <p:nvPicPr>
+          <p:cNvPr id="8" name="Picture 2" descr="Download Google Play Icon Royalty-Free Vector Graphic - Pixabay">
             <a:extLst>
               <a:ext uri="{FF2B5EF4-FFF2-40B4-BE49-F238E27FC236}">
-                <a16:creationId xmlns:a16="http://schemas.microsoft.com/office/drawing/2014/main" id="{C8E5D79E-9D08-2548-4F0B-DDA06A2DBD1F}"/>
+                <a16:creationId xmlns:a16="http://schemas.microsoft.com/office/drawing/2014/main" id="{BEA1DBC1-9F3D-7058-A7BE-F90B3C187439}"/>
               </a:ext>
             </a:extLst>
           </p:cNvPr>
-          <p:cNvSpPr txBox="1"/>
+          <p:cNvPicPr>
+            <a:picLocks noChangeAspect="1" noChangeArrowheads="1"/>
+          </p:cNvPicPr>
           <p:nvPr/>
-        </p:nvSpPr>
-        <p:spPr>
-          <a:xfrm>
-            <a:off x="2827244" y="9955568"/>
-            <a:ext cx="19577796" cy="1323439"/>
+        </p:nvPicPr>
+        <p:blipFill>
+          <a:blip r:embed="rId11">
+            <a:extLst>
+              <a:ext uri="{28A0092B-C50C-407E-A947-70E740481C1C}">
+                <a14:useLocalDpi xmlns:a14="http://schemas.microsoft.com/office/drawing/2010/main" val="0"/>
+              </a:ext>
+            </a:extLst>
+          </a:blip>
+          <a:srcRect/>
+          <a:stretch>
+            <a:fillRect/>
+          </a:stretch>
+        </p:blipFill>
+        <p:spPr bwMode="auto">
+          <a:xfrm>
+            <a:off x="14258316" y="22046769"/>
+            <a:ext cx="669811" cy="751101"/>
           </a:xfrm>
           <a:prstGeom prst="rect">
             <a:avLst/>
           </a:prstGeom>
           <a:noFill/>
-        </p:spPr>
-        <p:txBody>
-          <a:bodyPr wrap="square" rtlCol="0">
-            <a:spAutoFit/>
-          </a:bodyPr>
-          <a:lstStyle/>
-          <a:p>
-            <a:pPr algn="ctr"/>
-            <a:r>
-              <a:rPr lang="en-US" sz="8000" b="1" cap="small" dirty="0">
-                <a:ln w="6600">
-                  <a:solidFill>
-                    <a:srgbClr val="C00000"/>
-                  </a:solidFill>
-                  <a:prstDash val="solid"/>
-                </a:ln>
+          <a:extLst>
+            <a:ext uri="{909E8E84-426E-40DD-AFC4-6F175D3DCCD1}">
+              <a14:hiddenFill xmlns:a14="http://schemas.microsoft.com/office/drawing/2010/main">
                 <a:solidFill>
-                  <a:srgbClr val="C00000"/>
+                  <a:srgbClr val="FFFFFF"/>
                 </a:solidFill>
-                <a:effectLst>
-                  <a:glow rad="63500">
-                    <a:srgbClr val="C00000">
-                      <a:alpha val="40000"/>
-                    </a:srgbClr>
-                  </a:glow>
-                  <a:outerShdw dist="38100" dir="5400000" sy="-20000" rotWithShape="0">
-                    <a:prstClr val="black">
-                      <a:alpha val="0"/>
-                    </a:prstClr>
-                  </a:outerShdw>
-                </a:effectLst>
-                <a:latin typeface="Oxygen" panose="02000503000000000000" pitchFamily="2" charset="0"/>
-              </a:rPr>
-              <a:t>Artificial Intelligence</a:t>
-            </a:r>
-          </a:p>
-        </p:txBody>
-      </p:sp>
-      <p:sp>
-        <p:nvSpPr>
-          <p:cNvPr id="5" name="Rectangle 4">
+              </a14:hiddenFill>
+            </a:ext>
+          </a:extLst>
+        </p:spPr>
+      </p:pic>
+      <p:pic>
+        <p:nvPicPr>
+          <p:cNvPr id="12" name="Picture 11">
             <a:extLst>
               <a:ext uri="{FF2B5EF4-FFF2-40B4-BE49-F238E27FC236}">
-                <a16:creationId xmlns:a16="http://schemas.microsoft.com/office/drawing/2014/main" id="{E231E6C1-8A71-7918-F4FA-128A5C4BD48D}"/>
+                <a16:creationId xmlns:a16="http://schemas.microsoft.com/office/drawing/2014/main" id="{BC13B8B1-763B-A9D9-FA68-B1EB187598A0}"/>
+              </a:ext>
+            </a:extLst>
+          </p:cNvPr>
+          <p:cNvPicPr>
+            <a:picLocks noChangeAspect="1"/>
+          </p:cNvPicPr>
+          <p:nvPr/>
+        </p:nvPicPr>
+        <p:blipFill>
+          <a:blip r:embed="rId8">
+            <a:extLst>
+              <a:ext uri="{28A0092B-C50C-407E-A947-70E740481C1C}">
+                <a14:useLocalDpi xmlns:a14="http://schemas.microsoft.com/office/drawing/2010/main" val="0"/>
+              </a:ext>
+            </a:extLst>
+          </a:blip>
+          <a:stretch>
+            <a:fillRect/>
+          </a:stretch>
+        </p:blipFill>
+        <p:spPr>
+          <a:xfrm>
+            <a:off x="14207432" y="21024414"/>
+            <a:ext cx="810471" cy="766195"/>
+          </a:xfrm>
+          <a:prstGeom prst="rect">
+            <a:avLst/>
+          </a:prstGeom>
+        </p:spPr>
+      </p:pic>
+      <p:pic>
+        <p:nvPicPr>
+          <p:cNvPr id="14" name="Picture 13">
+            <a:extLst>
+              <a:ext uri="{FF2B5EF4-FFF2-40B4-BE49-F238E27FC236}">
+                <a16:creationId xmlns:a16="http://schemas.microsoft.com/office/drawing/2014/main" id="{806BDBC8-5427-681D-3069-DE61A6F2FE90}"/>
+              </a:ext>
+            </a:extLst>
+          </p:cNvPr>
+          <p:cNvPicPr>
+            <a:picLocks noChangeAspect="1"/>
+          </p:cNvPicPr>
+          <p:nvPr/>
+        </p:nvPicPr>
+        <p:blipFill>
+          <a:blip r:embed="rId12">
+            <a:extLst>
+              <a:ext uri="{28A0092B-C50C-407E-A947-70E740481C1C}">
+                <a14:useLocalDpi xmlns:a14="http://schemas.microsoft.com/office/drawing/2010/main" val="0"/>
+              </a:ext>
+            </a:extLst>
+          </a:blip>
+          <a:stretch>
+            <a:fillRect/>
+          </a:stretch>
+        </p:blipFill>
+        <p:spPr>
+          <a:xfrm>
+            <a:off x="15367483" y="21001514"/>
+            <a:ext cx="1786804" cy="1786804"/>
+          </a:xfrm>
+          <a:prstGeom prst="rect">
+            <a:avLst/>
+          </a:prstGeom>
+        </p:spPr>
+      </p:pic>
+      <p:sp>
+        <p:nvSpPr>
+          <p:cNvPr id="15" name="Rectangle 14">
+            <a:extLst>
+              <a:ext uri="{FF2B5EF4-FFF2-40B4-BE49-F238E27FC236}">
+                <a16:creationId xmlns:a16="http://schemas.microsoft.com/office/drawing/2014/main" id="{A310EDDE-D63D-050B-563F-D68F71529E53}"/>
               </a:ext>
             </a:extLst>
           </p:cNvPr>
@@ -5011,8 +5635,8 @@
         </p:nvSpPr>
         <p:spPr>
           <a:xfrm>
-            <a:off x="-542" y="34467821"/>
-            <a:ext cx="25603742" cy="1904610"/>
+            <a:off x="-542" y="34972461"/>
+            <a:ext cx="25603742" cy="1399970"/>
           </a:xfrm>
           <a:prstGeom prst="rect">
             <a:avLst/>
@@ -5076,120 +5700,26 @@
           </a:p>
         </p:txBody>
       </p:sp>
-      <p:pic>
-        <p:nvPicPr>
-          <p:cNvPr id="6" name="Picture 10" descr="New Instagram Logo PNG Images 2023">
+      <p:sp>
+        <p:nvSpPr>
+          <p:cNvPr id="25" name="Rectangle 24">
             <a:extLst>
               <a:ext uri="{FF2B5EF4-FFF2-40B4-BE49-F238E27FC236}">
-                <a16:creationId xmlns:a16="http://schemas.microsoft.com/office/drawing/2014/main" id="{98841CC8-1EC6-26F0-EC8E-1C2569DA81CF}"/>
+                <a16:creationId xmlns:a16="http://schemas.microsoft.com/office/drawing/2014/main" id="{8C9E3CD1-FD39-8832-ADFA-AEB98F1138AE}"/>
               </a:ext>
             </a:extLst>
           </p:cNvPr>
-          <p:cNvPicPr>
-            <a:picLocks noChangeAspect="1" noChangeArrowheads="1"/>
-          </p:cNvPicPr>
+          <p:cNvSpPr/>
           <p:nvPr/>
-        </p:nvPicPr>
-        <p:blipFill>
-          <a:blip r:embed="rId5" cstate="print">
-            <a:extLst>
-              <a:ext uri="{28A0092B-C50C-407E-A947-70E740481C1C}">
-                <a14:useLocalDpi xmlns:a14="http://schemas.microsoft.com/office/drawing/2010/main" val="0"/>
-              </a:ext>
-            </a:extLst>
-          </a:blip>
-          <a:srcRect/>
-          <a:stretch>
-            <a:fillRect/>
-          </a:stretch>
-        </p:blipFill>
-        <p:spPr bwMode="auto">
-          <a:xfrm>
-            <a:off x="3737124" y="35281376"/>
-            <a:ext cx="918773" cy="918773"/>
+        </p:nvSpPr>
+        <p:spPr>
+          <a:xfrm>
+            <a:off x="5112852" y="35442221"/>
+            <a:ext cx="14214148" cy="830997"/>
           </a:xfrm>
           <a:prstGeom prst="rect">
             <a:avLst/>
           </a:prstGeom>
-          <a:noFill/>
-          <a:extLst>
-            <a:ext uri="{909E8E84-426E-40DD-AFC4-6F175D3DCCD1}">
-              <a14:hiddenFill xmlns:a14="http://schemas.microsoft.com/office/drawing/2010/main">
-                <a:solidFill>
-                  <a:srgbClr val="FFFFFF"/>
-                </a:solidFill>
-              </a14:hiddenFill>
-            </a:ext>
-          </a:extLst>
-        </p:spPr>
-      </p:pic>
-      <p:pic>
-        <p:nvPicPr>
-          <p:cNvPr id="7" name="Picture 16" descr="Linkedin logo png, Linkedin icon transparent png 18930587 PNG">
-            <a:extLst>
-              <a:ext uri="{FF2B5EF4-FFF2-40B4-BE49-F238E27FC236}">
-                <a16:creationId xmlns:a16="http://schemas.microsoft.com/office/drawing/2014/main" id="{A51F06DF-ED8F-DD91-9E02-33A1DB32DAD5}"/>
-              </a:ext>
-            </a:extLst>
-          </p:cNvPr>
-          <p:cNvPicPr>
-            <a:picLocks noChangeAspect="1" noChangeArrowheads="1"/>
-          </p:cNvPicPr>
-          <p:nvPr/>
-        </p:nvPicPr>
-        <p:blipFill>
-          <a:blip r:embed="rId6" cstate="print">
-            <a:extLst>
-              <a:ext uri="{28A0092B-C50C-407E-A947-70E740481C1C}">
-                <a14:useLocalDpi xmlns:a14="http://schemas.microsoft.com/office/drawing/2010/main" val="0"/>
-              </a:ext>
-            </a:extLst>
-          </a:blip>
-          <a:srcRect/>
-          <a:stretch>
-            <a:fillRect/>
-          </a:stretch>
-        </p:blipFill>
-        <p:spPr bwMode="auto">
-          <a:xfrm>
-            <a:off x="1065533" y="34938005"/>
-            <a:ext cx="1605516" cy="1605516"/>
-          </a:xfrm>
-          <a:prstGeom prst="rect">
-            <a:avLst/>
-          </a:prstGeom>
-          <a:noFill/>
-          <a:extLst>
-            <a:ext uri="{909E8E84-426E-40DD-AFC4-6F175D3DCCD1}">
-              <a14:hiddenFill xmlns:a14="http://schemas.microsoft.com/office/drawing/2010/main">
-                <a:solidFill>
-                  <a:srgbClr val="FFFFFF"/>
-                </a:solidFill>
-              </a14:hiddenFill>
-            </a:ext>
-          </a:extLst>
-        </p:spPr>
-      </p:pic>
-      <p:sp>
-        <p:nvSpPr>
-          <p:cNvPr id="8" name="Rectangle 7">
-            <a:extLst>
-              <a:ext uri="{FF2B5EF4-FFF2-40B4-BE49-F238E27FC236}">
-                <a16:creationId xmlns:a16="http://schemas.microsoft.com/office/drawing/2014/main" id="{CCA8FE64-7F8F-D559-8871-D0C66B38743D}"/>
-              </a:ext>
-            </a:extLst>
-          </p:cNvPr>
-          <p:cNvSpPr/>
-          <p:nvPr/>
-        </p:nvSpPr>
-        <p:spPr>
-          <a:xfrm>
-            <a:off x="6374261" y="35278281"/>
-            <a:ext cx="17739152" cy="1015663"/>
-          </a:xfrm>
-          <a:prstGeom prst="rect">
-            <a:avLst/>
-          </a:prstGeom>
         </p:spPr>
         <p:txBody>
           <a:bodyPr wrap="none">
@@ -5197,8 +5727,9 @@
           </a:bodyPr>
           <a:lstStyle/>
           <a:p>
-            <a:r>
-              <a:rPr lang="en-US" sz="6000" b="1" dirty="0">
+            <a:pPr algn="ctr"/>
+            <a:r>
+              <a:rPr lang="en-US" sz="4800" b="1" dirty="0">
                 <a:solidFill>
                   <a:srgbClr val="0000FF"/>
                 </a:solidFill>
@@ -5206,7 +5737,7 @@
               </a:rPr>
               <a:t>www.anodiam.com    ||    anirban@anodiam.com</a:t>
             </a:r>
-            <a:endParaRPr lang="en-AU" sz="6000" dirty="0">
+            <a:endParaRPr lang="en-AU" sz="4800" dirty="0">
               <a:solidFill>
                 <a:srgbClr val="0000FF"/>
               </a:solidFill>
@@ -5216,172 +5747,72 @@
       </p:sp>
       <p:sp>
         <p:nvSpPr>
-          <p:cNvPr id="12" name="32-Point Star 20">
+          <p:cNvPr id="33" name="TextBox 32">
             <a:extLst>
               <a:ext uri="{FF2B5EF4-FFF2-40B4-BE49-F238E27FC236}">
-                <a16:creationId xmlns:a16="http://schemas.microsoft.com/office/drawing/2014/main" id="{BD9CFE2F-79CC-C45C-40D3-0B51E59C64D8}"/>
+                <a16:creationId xmlns:a16="http://schemas.microsoft.com/office/drawing/2014/main" id="{5745F6B8-7CC5-CDBD-4A48-A7D5F9303E3B}"/>
               </a:ext>
             </a:extLst>
           </p:cNvPr>
-          <p:cNvSpPr/>
+          <p:cNvSpPr txBox="1"/>
           <p:nvPr/>
         </p:nvSpPr>
         <p:spPr>
-          <a:xfrm rot="21243013">
-            <a:off x="480028" y="10483154"/>
-            <a:ext cx="7032196" cy="3773366"/>
-          </a:xfrm>
-          <a:prstGeom prst="star32">
-            <a:avLst/>
-          </a:prstGeom>
-          <a:solidFill>
-            <a:srgbClr val="002060"/>
-          </a:solidFill>
-          <a:ln w="190500">
-            <a:solidFill>
-              <a:srgbClr val="FF0000"/>
-            </a:solidFill>
-          </a:ln>
-        </p:spPr>
-        <p:style>
-          <a:lnRef idx="2">
-            <a:schemeClr val="accent1">
-              <a:shade val="50000"/>
-            </a:schemeClr>
-          </a:lnRef>
-          <a:fillRef idx="1">
-            <a:schemeClr val="accent1"/>
-          </a:fillRef>
-          <a:effectRef idx="0">
-            <a:schemeClr val="accent1"/>
-          </a:effectRef>
-          <a:fontRef idx="minor">
-            <a:schemeClr val="lt1"/>
-          </a:fontRef>
-        </p:style>
-        <p:txBody>
-          <a:bodyPr rtlCol="0" anchor="ctr"/>
-          <a:lstStyle/>
-          <a:p>
-            <a:pPr algn="ctr"/>
-            <a:r>
-              <a:rPr lang="en-US" sz="2800" b="1" cap="small" dirty="0">
-                <a:solidFill>
-                  <a:schemeClr val="bg1"/>
-                </a:solidFill>
-                <a:latin typeface="Oxygen" panose="02000503000000000000" pitchFamily="2" charset="0"/>
-              </a:rPr>
-              <a:t>Upto </a:t>
-            </a:r>
-            <a:r>
-              <a:rPr lang="en-US" sz="10400" b="1" cap="small" dirty="0">
-                <a:solidFill>
-                  <a:schemeClr val="bg1"/>
-                </a:solidFill>
-                <a:latin typeface="Oxygen" panose="02000503000000000000" pitchFamily="2" charset="0"/>
-              </a:rPr>
-              <a:t>50%</a:t>
-            </a:r>
-            <a:r>
-              <a:rPr lang="en-US" sz="2800" b="1" cap="small" dirty="0">
-                <a:solidFill>
-                  <a:schemeClr val="bg1"/>
-                </a:solidFill>
-                <a:latin typeface="Oxygen" panose="02000503000000000000" pitchFamily="2" charset="0"/>
-              </a:rPr>
-              <a:t> Off</a:t>
-            </a:r>
-            <a:r>
-              <a:rPr lang="en-US" sz="4400" b="1" cap="small" dirty="0">
-                <a:solidFill>
-                  <a:schemeClr val="bg1"/>
-                </a:solidFill>
-                <a:latin typeface="Oxygen" panose="02000503000000000000" pitchFamily="2" charset="0"/>
-              </a:rPr>
-              <a:t> </a:t>
-            </a:r>
-          </a:p>
-          <a:p>
-            <a:pPr algn="ctr"/>
-            <a:r>
-              <a:rPr lang="en-US" sz="2800" b="1" cap="small" dirty="0">
-                <a:solidFill>
-                  <a:schemeClr val="bg1"/>
-                </a:solidFill>
-                <a:latin typeface="Oxygen" panose="02000503000000000000" pitchFamily="2" charset="0"/>
-              </a:rPr>
-              <a:t>T&amp;C Applies</a:t>
-            </a:r>
-          </a:p>
-        </p:txBody>
-      </p:sp>
-      <p:pic>
-        <p:nvPicPr>
-          <p:cNvPr id="40" name="Picture 14" descr="Whatsapp Icon PNGs for Free Download">
-            <a:extLst>
-              <a:ext uri="{FF2B5EF4-FFF2-40B4-BE49-F238E27FC236}">
-                <a16:creationId xmlns:a16="http://schemas.microsoft.com/office/drawing/2014/main" id="{4614A863-72B5-6D79-5611-3F749E580A6C}"/>
-              </a:ext>
-            </a:extLst>
-          </p:cNvPr>
-          <p:cNvPicPr>
-            <a:picLocks noChangeAspect="1" noChangeArrowheads="1"/>
-          </p:cNvPicPr>
-          <p:nvPr/>
-        </p:nvPicPr>
-        <p:blipFill>
-          <a:blip r:embed="rId7" cstate="print">
-            <a:extLst>
-              <a:ext uri="{28A0092B-C50C-407E-A947-70E740481C1C}">
-                <a14:useLocalDpi xmlns:a14="http://schemas.microsoft.com/office/drawing/2010/main" val="0"/>
-              </a:ext>
-            </a:extLst>
-          </a:blip>
-          <a:srcRect/>
-          <a:stretch>
-            <a:fillRect/>
-          </a:stretch>
-        </p:blipFill>
-        <p:spPr bwMode="auto">
-          <a:xfrm>
-            <a:off x="16384425" y="13377786"/>
-            <a:ext cx="1046991" cy="1046991"/>
+          <a:xfrm>
+            <a:off x="-65414" y="33772509"/>
+            <a:ext cx="25603742" cy="1323439"/>
           </a:xfrm>
           <a:prstGeom prst="rect">
             <a:avLst/>
           </a:prstGeom>
           <a:noFill/>
-          <a:extLst>
-            <a:ext uri="{909E8E84-426E-40DD-AFC4-6F175D3DCCD1}">
-              <a14:hiddenFill xmlns:a14="http://schemas.microsoft.com/office/drawing/2010/main">
-                <a:solidFill>
-                  <a:srgbClr val="FFFFFF"/>
-                </a:solidFill>
-              </a14:hiddenFill>
-            </a:ext>
-          </a:extLst>
-        </p:spPr>
-      </p:pic>
-      <p:sp>
-        <p:nvSpPr>
-          <p:cNvPr id="41" name="Rectangle 40">
+        </p:spPr>
+        <p:txBody>
+          <a:bodyPr wrap="square">
+            <a:spAutoFit/>
+          </a:bodyPr>
+          <a:lstStyle/>
+          <a:p>
+            <a:pPr algn="ctr"/>
+            <a:r>
+              <a:rPr lang="en-US" sz="4000" b="1" cap="small" dirty="0">
+                <a:latin typeface="Oxygen" panose="02000503000000000000" pitchFamily="2" charset="0"/>
+              </a:rPr>
+              <a:t>Globally experienced faculty from prestigious organizations, fun &amp; easy learning</a:t>
+            </a:r>
+          </a:p>
+          <a:p>
+            <a:pPr algn="ctr"/>
+            <a:r>
+              <a:rPr lang="en-US" sz="4000" b="1" cap="small" dirty="0">
+                <a:latin typeface="Oxygen" panose="02000503000000000000" pitchFamily="2" charset="0"/>
+              </a:rPr>
+              <a:t>Project based, Career Focused, Certification Help, Smart Classrooms, AC, CCTV</a:t>
+            </a:r>
+          </a:p>
+        </p:txBody>
+      </p:sp>
+      <p:sp>
+        <p:nvSpPr>
+          <p:cNvPr id="36" name="TextBox 35">
             <a:extLst>
               <a:ext uri="{FF2B5EF4-FFF2-40B4-BE49-F238E27FC236}">
-                <a16:creationId xmlns:a16="http://schemas.microsoft.com/office/drawing/2014/main" id="{F9D8F186-43FC-19CD-B884-5AEC7E1E6390}"/>
+                <a16:creationId xmlns:a16="http://schemas.microsoft.com/office/drawing/2014/main" id="{B4B9A645-03A9-EDD4-0179-DCC3EFC1B118}"/>
               </a:ext>
             </a:extLst>
           </p:cNvPr>
-          <p:cNvSpPr/>
+          <p:cNvSpPr txBox="1"/>
           <p:nvPr/>
         </p:nvSpPr>
         <p:spPr>
           <a:xfrm>
-            <a:off x="8307461" y="12794433"/>
-            <a:ext cx="8984380" cy="1707262"/>
+            <a:off x="1" y="24305370"/>
+            <a:ext cx="25625100" cy="8833187"/>
           </a:xfrm>
           <a:prstGeom prst="rect">
             <a:avLst/>
           </a:prstGeom>
+          <a:noFill/>
         </p:spPr>
         <p:txBody>
           <a:bodyPr wrap="square">
@@ -5395,112 +5826,126 @@
               </a:lnSpc>
             </a:pPr>
             <a:r>
-              <a:rPr lang="en-US" sz="8000" b="1" cap="small" dirty="0">
-                <a:ln w="6600">
-                  <a:solidFill>
-                    <a:srgbClr val="C00000"/>
-                  </a:solidFill>
-                  <a:prstDash val="solid"/>
-                </a:ln>
+              <a:rPr lang="en-US" sz="8800" b="1" cap="small" dirty="0">
                 <a:solidFill>
                   <a:srgbClr val="C00000"/>
                 </a:solidFill>
-                <a:effectLst>
-                  <a:glow rad="63500">
-                    <a:srgbClr val="C00000">
-                      <a:alpha val="40000"/>
-                    </a:srgbClr>
-                  </a:glow>
-                  <a:outerShdw dist="38100" dir="5400000" sy="-20000" rotWithShape="0">
-                    <a:prstClr val="black">
-                      <a:alpha val="0"/>
-                    </a:prstClr>
-                  </a:outerShdw>
-                </a:effectLst>
                 <a:latin typeface="Oxygen" panose="02000503000000000000" pitchFamily="2" charset="0"/>
               </a:rPr>
-              <a:t>9073 700094</a:t>
-            </a:r>
-            <a:endParaRPr lang="en-AU" sz="8000" b="1" cap="small" dirty="0">
-              <a:ln w="6600">
+              <a:t>AI, IoT-Robotics, Coding – Class III-XII</a:t>
+            </a:r>
+          </a:p>
+          <a:p>
+            <a:pPr algn="ctr">
+              <a:lnSpc>
+                <a:spcPct val="150000"/>
+              </a:lnSpc>
+            </a:pPr>
+            <a:r>
+              <a:rPr lang="en-US" sz="8800" b="1" cap="small" dirty="0">
                 <a:solidFill>
                   <a:srgbClr val="C00000"/>
                 </a:solidFill>
-                <a:prstDash val="solid"/>
-              </a:ln>
+                <a:latin typeface="Oxygen" panose="02000503000000000000" pitchFamily="2" charset="0"/>
+              </a:rPr>
+              <a:t>IT &amp; AI Professional Training &amp; Projects</a:t>
+            </a:r>
+          </a:p>
+          <a:p>
+            <a:pPr algn="ctr"/>
+            <a:endParaRPr lang="en-US" sz="1600" b="1" cap="small" dirty="0">
               <a:solidFill>
                 <a:srgbClr val="C00000"/>
               </a:solidFill>
-              <a:effectLst>
-                <a:glow rad="63500">
-                  <a:srgbClr val="C00000">
-                    <a:alpha val="40000"/>
-                  </a:srgbClr>
-                </a:glow>
-                <a:outerShdw dist="38100" dir="5400000" sy="-20000" rotWithShape="0">
-                  <a:prstClr val="black">
-                    <a:alpha val="0"/>
-                  </a:prstClr>
-                </a:outerShdw>
-              </a:effectLst>
               <a:latin typeface="Oxygen" panose="02000503000000000000" pitchFamily="2" charset="0"/>
             </a:endParaRPr>
           </a:p>
+          <a:p>
+            <a:pPr algn="ctr"/>
+            <a:r>
+              <a:rPr lang="en-US" sz="4800" b="1" cap="small" dirty="0">
+                <a:solidFill>
+                  <a:srgbClr val="C00000"/>
+                </a:solidFill>
+                <a:latin typeface="Oxygen" panose="02000503000000000000" pitchFamily="2" charset="0"/>
+              </a:rPr>
+              <a:t>Data Science, Computer Vision, NLP, DSP, Python</a:t>
+            </a:r>
+          </a:p>
+          <a:p>
+            <a:pPr algn="ctr"/>
+            <a:r>
+              <a:rPr lang="en-US" sz="4800" b="1" cap="small" dirty="0">
+                <a:solidFill>
+                  <a:srgbClr val="C00000"/>
+                </a:solidFill>
+                <a:latin typeface="Oxygen" panose="02000503000000000000" pitchFamily="2" charset="0"/>
+              </a:rPr>
+              <a:t>Data Analytics, C, C++, IoT, Robotics</a:t>
+            </a:r>
+          </a:p>
+          <a:p>
+            <a:pPr algn="ctr"/>
+            <a:r>
+              <a:rPr lang="en-US" sz="4800" b="1" cap="small" dirty="0">
+                <a:solidFill>
+                  <a:srgbClr val="C00000"/>
+                </a:solidFill>
+                <a:latin typeface="Oxygen" panose="02000503000000000000" pitchFamily="2" charset="0"/>
+              </a:rPr>
+              <a:t>Java, .NET, JavaScript, ReactJS, Native, PHP</a:t>
+            </a:r>
+          </a:p>
+          <a:p>
+            <a:pPr algn="ctr"/>
+            <a:r>
+              <a:rPr lang="en-US" sz="4800" b="1" cap="small" dirty="0">
+                <a:solidFill>
+                  <a:srgbClr val="C00000"/>
+                </a:solidFill>
+                <a:latin typeface="Oxygen" panose="02000503000000000000" pitchFamily="2" charset="0"/>
+              </a:rPr>
+              <a:t>DevOps, Docker, Kubernetes, Cloud</a:t>
+            </a:r>
+          </a:p>
+          <a:p>
+            <a:pPr algn="ctr"/>
+            <a:r>
+              <a:rPr lang="en-US" sz="4800" b="1" cap="small" dirty="0">
+                <a:solidFill>
+                  <a:srgbClr val="C00000"/>
+                </a:solidFill>
+                <a:latin typeface="Oxygen" panose="02000503000000000000" pitchFamily="2" charset="0"/>
+              </a:rPr>
+              <a:t>Database, Firebase, Cyber Sec, Automation Test</a:t>
+            </a:r>
+          </a:p>
+          <a:p>
+            <a:pPr algn="ctr"/>
+            <a:r>
+              <a:rPr lang="en-US" sz="4800" b="1" cap="small" dirty="0">
+                <a:solidFill>
+                  <a:srgbClr val="C00000"/>
+                </a:solidFill>
+                <a:latin typeface="Oxygen" panose="02000503000000000000" pitchFamily="2" charset="0"/>
+              </a:rPr>
+              <a:t>Pmp, Agile, Office, Adv Excel, Tally, Html, Css</a:t>
+            </a:r>
+            <a:endParaRPr lang="en-US" sz="6000" b="1" cap="small" dirty="0">
+              <a:solidFill>
+                <a:srgbClr val="C00000"/>
+              </a:solidFill>
+              <a:latin typeface="Oxygen" panose="02000503000000000000" pitchFamily="2" charset="0"/>
+            </a:endParaRPr>
+          </a:p>
         </p:txBody>
       </p:sp>
       <p:pic>
         <p:nvPicPr>
-          <p:cNvPr id="42" name="Picture 18" descr="Page 2 | Phone Icon Png Images - Free Download on Freepik">
+          <p:cNvPr id="6" name="Picture 5">
             <a:extLst>
               <a:ext uri="{FF2B5EF4-FFF2-40B4-BE49-F238E27FC236}">
-                <a16:creationId xmlns:a16="http://schemas.microsoft.com/office/drawing/2014/main" id="{0AE7602C-AB89-8DF9-830B-C813846C2C66}"/>
-              </a:ext>
-            </a:extLst>
-          </p:cNvPr>
-          <p:cNvPicPr>
-            <a:picLocks noChangeAspect="1" noChangeArrowheads="1"/>
-          </p:cNvPicPr>
-          <p:nvPr/>
-        </p:nvPicPr>
-        <p:blipFill>
-          <a:blip r:embed="rId8" cstate="print">
-            <a:extLst>
-              <a:ext uri="{28A0092B-C50C-407E-A947-70E740481C1C}">
-                <a14:useLocalDpi xmlns:a14="http://schemas.microsoft.com/office/drawing/2010/main" val="0"/>
-              </a:ext>
-            </a:extLst>
-          </a:blip>
-          <a:srcRect/>
-          <a:stretch>
-            <a:fillRect/>
-          </a:stretch>
-        </p:blipFill>
-        <p:spPr bwMode="auto">
-          <a:xfrm>
-            <a:off x="8307461" y="13436184"/>
-            <a:ext cx="964851" cy="964851"/>
-          </a:xfrm>
-          <a:prstGeom prst="rect">
-            <a:avLst/>
-          </a:prstGeom>
-          <a:noFill/>
-          <a:extLst>
-            <a:ext uri="{909E8E84-426E-40DD-AFC4-6F175D3DCCD1}">
-              <a14:hiddenFill xmlns:a14="http://schemas.microsoft.com/office/drawing/2010/main">
-                <a:solidFill>
-                  <a:srgbClr val="FFFFFF"/>
-                </a:solidFill>
-              </a14:hiddenFill>
-            </a:ext>
-          </a:extLst>
-        </p:spPr>
-      </p:pic>
-      <p:pic>
-        <p:nvPicPr>
-          <p:cNvPr id="10" name="Picture 9">
-            <a:extLst>
-              <a:ext uri="{FF2B5EF4-FFF2-40B4-BE49-F238E27FC236}">
-                <a16:creationId xmlns:a16="http://schemas.microsoft.com/office/drawing/2014/main" id="{27AEA0E6-AFA8-3AF8-6E68-4C7CD1F8BB73}"/>
+                <a16:creationId xmlns:a16="http://schemas.microsoft.com/office/drawing/2014/main" id="{A2370A9E-959A-457A-FDB7-69D1E302FA1B}"/>
               </a:ext>
             </a:extLst>
           </p:cNvPr>
@@ -5510,17 +5955,8 @@
           <p:nvPr/>
         </p:nvPicPr>
         <p:blipFill>
-          <a:blip r:embed="rId9">
-            <a:extLst>
-              <a:ext uri="{BEBA8EAE-BF5A-486C-A8C5-ECC9F3942E4B}">
-                <a14:imgProps xmlns:a14="http://schemas.microsoft.com/office/drawing/2010/main">
-                  <a14:imgLayer r:embed="rId10">
-                    <a14:imgEffect>
-                      <a14:brightnessContrast bright="20000" contrast="16000"/>
-                    </a14:imgEffect>
-                  </a14:imgLayer>
-                </a14:imgProps>
-              </a:ext>
+          <a:blip r:embed="rId13">
+            <a:extLst>
               <a:ext uri="{28A0092B-C50C-407E-A947-70E740481C1C}">
                 <a14:useLocalDpi xmlns:a14="http://schemas.microsoft.com/office/drawing/2010/main" val="0"/>
               </a:ext>
@@ -5532,56 +5968,20 @@
         </p:blipFill>
         <p:spPr>
           <a:xfrm>
-            <a:off x="-750558" y="8812897"/>
-            <a:ext cx="15662123" cy="20834598"/>
+            <a:off x="11846967" y="21001513"/>
+            <a:ext cx="1786804" cy="1786804"/>
           </a:xfrm>
           <a:prstGeom prst="rect">
             <a:avLst/>
           </a:prstGeom>
         </p:spPr>
       </p:pic>
-      <p:pic>
-        <p:nvPicPr>
-          <p:cNvPr id="17" name="Picture 16">
+      <p:sp>
+        <p:nvSpPr>
+          <p:cNvPr id="7" name="Freeform: Shape 6">
             <a:extLst>
               <a:ext uri="{FF2B5EF4-FFF2-40B4-BE49-F238E27FC236}">
-                <a16:creationId xmlns:a16="http://schemas.microsoft.com/office/drawing/2014/main" id="{2A88CD58-A345-2D82-B535-B54DF3C15F5C}"/>
-              </a:ext>
-            </a:extLst>
-          </p:cNvPr>
-          <p:cNvPicPr>
-            <a:picLocks noChangeAspect="1"/>
-          </p:cNvPicPr>
-          <p:nvPr/>
-        </p:nvPicPr>
-        <p:blipFill>
-          <a:blip r:embed="rId11">
-            <a:extLst>
-              <a:ext uri="{28A0092B-C50C-407E-A947-70E740481C1C}">
-                <a14:useLocalDpi xmlns:a14="http://schemas.microsoft.com/office/drawing/2010/main" val="0"/>
-              </a:ext>
-            </a:extLst>
-          </a:blip>
-          <a:stretch>
-            <a:fillRect/>
-          </a:stretch>
-        </p:blipFill>
-        <p:spPr>
-          <a:xfrm rot="21440353">
-            <a:off x="14537743" y="17910028"/>
-            <a:ext cx="1197356" cy="1131942"/>
-          </a:xfrm>
-          <a:prstGeom prst="rect">
-            <a:avLst/>
-          </a:prstGeom>
-        </p:spPr>
-      </p:pic>
-      <p:sp>
-        <p:nvSpPr>
-          <p:cNvPr id="11" name="Rectangle 10">
-            <a:extLst>
-              <a:ext uri="{FF2B5EF4-FFF2-40B4-BE49-F238E27FC236}">
-                <a16:creationId xmlns:a16="http://schemas.microsoft.com/office/drawing/2014/main" id="{119463C9-234E-E885-5699-32205E3F5A37}"/>
+                <a16:creationId xmlns:a16="http://schemas.microsoft.com/office/drawing/2014/main" id="{D5E61F02-DF69-0436-11E1-C548439C67BA}"/>
               </a:ext>
             </a:extLst>
           </p:cNvPr>
@@ -5590,436 +5990,8 @@
         </p:nvSpPr>
         <p:spPr>
           <a:xfrm>
-            <a:off x="8875" y="22406452"/>
-            <a:ext cx="14113683" cy="9835339"/>
-          </a:xfrm>
-          <a:prstGeom prst="rect">
-            <a:avLst/>
-          </a:prstGeom>
-          <a:solidFill>
-            <a:schemeClr val="bg1"/>
-          </a:solidFill>
-          <a:ln>
-            <a:noFill/>
-          </a:ln>
-        </p:spPr>
-        <p:style>
-          <a:lnRef idx="2">
-            <a:schemeClr val="accent1">
-              <a:shade val="15000"/>
-            </a:schemeClr>
-          </a:lnRef>
-          <a:fillRef idx="1">
-            <a:schemeClr val="accent1"/>
-          </a:fillRef>
-          <a:effectRef idx="0">
-            <a:schemeClr val="accent1"/>
-          </a:effectRef>
-          <a:fontRef idx="minor">
-            <a:schemeClr val="lt1"/>
-          </a:fontRef>
-        </p:style>
-        <p:txBody>
-          <a:bodyPr rtlCol="0" anchor="ctr"/>
-          <a:lstStyle/>
-          <a:p>
-            <a:pPr algn="ctr"/>
-            <a:endParaRPr lang="en-US"/>
-          </a:p>
-        </p:txBody>
-      </p:sp>
-      <p:pic>
-        <p:nvPicPr>
-          <p:cNvPr id="26" name="Picture 25">
-            <a:extLst>
-              <a:ext uri="{FF2B5EF4-FFF2-40B4-BE49-F238E27FC236}">
-                <a16:creationId xmlns:a16="http://schemas.microsoft.com/office/drawing/2014/main" id="{40B5BD0E-27AF-1848-9DB4-89CEFD0A700E}"/>
-              </a:ext>
-            </a:extLst>
-          </p:cNvPr>
-          <p:cNvPicPr>
-            <a:picLocks noChangeAspect="1"/>
-          </p:cNvPicPr>
-          <p:nvPr/>
-        </p:nvPicPr>
-        <p:blipFill>
-          <a:blip r:embed="rId12">
-            <a:extLst>
-              <a:ext uri="{28A0092B-C50C-407E-A947-70E740481C1C}">
-                <a14:useLocalDpi xmlns:a14="http://schemas.microsoft.com/office/drawing/2010/main" val="0"/>
-              </a:ext>
-            </a:extLst>
-          </a:blip>
-          <a:stretch>
-            <a:fillRect/>
-          </a:stretch>
-        </p:blipFill>
-        <p:spPr>
-          <a:xfrm>
-            <a:off x="8307461" y="16324314"/>
-            <a:ext cx="7867318" cy="5811765"/>
-          </a:xfrm>
-          <a:prstGeom prst="rect">
-            <a:avLst/>
-          </a:prstGeom>
-        </p:spPr>
-      </p:pic>
-      <p:pic>
-        <p:nvPicPr>
-          <p:cNvPr id="28" name="Picture 27">
-            <a:extLst>
-              <a:ext uri="{FF2B5EF4-FFF2-40B4-BE49-F238E27FC236}">
-                <a16:creationId xmlns:a16="http://schemas.microsoft.com/office/drawing/2014/main" id="{BB4E11D7-E18B-A672-A882-F19BAC3646FD}"/>
-              </a:ext>
-            </a:extLst>
-          </p:cNvPr>
-          <p:cNvPicPr>
-            <a:picLocks noChangeAspect="1"/>
-          </p:cNvPicPr>
-          <p:nvPr/>
-        </p:nvPicPr>
-        <p:blipFill>
-          <a:blip r:embed="rId12">
-            <a:extLst>
-              <a:ext uri="{28A0092B-C50C-407E-A947-70E740481C1C}">
-                <a14:useLocalDpi xmlns:a14="http://schemas.microsoft.com/office/drawing/2010/main" val="0"/>
-              </a:ext>
-            </a:extLst>
-          </a:blip>
-          <a:stretch>
-            <a:fillRect/>
-          </a:stretch>
-        </p:blipFill>
-        <p:spPr>
-          <a:xfrm flipH="1">
-            <a:off x="-2013772" y="16126404"/>
-            <a:ext cx="7358184" cy="5811765"/>
-          </a:xfrm>
-          <a:prstGeom prst="rect">
-            <a:avLst/>
-          </a:prstGeom>
-        </p:spPr>
-      </p:pic>
-      <p:pic>
-        <p:nvPicPr>
-          <p:cNvPr id="29" name="Picture 28">
-            <a:extLst>
-              <a:ext uri="{FF2B5EF4-FFF2-40B4-BE49-F238E27FC236}">
-                <a16:creationId xmlns:a16="http://schemas.microsoft.com/office/drawing/2014/main" id="{A622DD28-862B-63BF-DF65-1EC2D878807E}"/>
-              </a:ext>
-            </a:extLst>
-          </p:cNvPr>
-          <p:cNvPicPr>
-            <a:picLocks noChangeAspect="1"/>
-          </p:cNvPicPr>
-          <p:nvPr/>
-        </p:nvPicPr>
-        <p:blipFill>
-          <a:blip r:embed="rId13"/>
-          <a:stretch>
-            <a:fillRect/>
-          </a:stretch>
-        </p:blipFill>
-        <p:spPr>
-          <a:xfrm>
-            <a:off x="13878" y="19754748"/>
-            <a:ext cx="9895043" cy="2381331"/>
-          </a:xfrm>
-          <a:prstGeom prst="rect">
-            <a:avLst/>
-          </a:prstGeom>
-        </p:spPr>
-      </p:pic>
-      <p:sp>
-        <p:nvSpPr>
-          <p:cNvPr id="14" name="Rectangle 13">
-            <a:extLst>
-              <a:ext uri="{FF2B5EF4-FFF2-40B4-BE49-F238E27FC236}">
-                <a16:creationId xmlns:a16="http://schemas.microsoft.com/office/drawing/2014/main" id="{041BE2BD-8529-D218-8E1F-10F4E5F9D9D2}"/>
-              </a:ext>
-            </a:extLst>
-          </p:cNvPr>
-          <p:cNvSpPr/>
-          <p:nvPr/>
-        </p:nvSpPr>
-        <p:spPr>
-          <a:xfrm>
-            <a:off x="12949068" y="25479426"/>
-            <a:ext cx="5877879" cy="707886"/>
-          </a:xfrm>
-          <a:prstGeom prst="rect">
-            <a:avLst/>
-          </a:prstGeom>
-        </p:spPr>
-        <p:txBody>
-          <a:bodyPr wrap="square">
-            <a:spAutoFit/>
-          </a:bodyPr>
-          <a:lstStyle/>
-          <a:p>
-            <a:r>
-              <a:rPr lang="en-AU" sz="4000" b="1" dirty="0">
-                <a:solidFill>
-                  <a:srgbClr val="002060"/>
-                </a:solidFill>
-                <a:latin typeface="Oxygen" panose="02000503000000000000" pitchFamily="2" charset="0"/>
-              </a:rPr>
-              <a:t>App Download</a:t>
-            </a:r>
-          </a:p>
-        </p:txBody>
-      </p:sp>
-      <p:pic>
-        <p:nvPicPr>
-          <p:cNvPr id="21" name="Picture 2" descr="Download Google Play Icon Royalty-Free Vector Graphic - Pixabay">
-            <a:extLst>
-              <a:ext uri="{FF2B5EF4-FFF2-40B4-BE49-F238E27FC236}">
-                <a16:creationId xmlns:a16="http://schemas.microsoft.com/office/drawing/2014/main" id="{9AEE542A-CA60-A5F9-1607-1575C45B79B3}"/>
-              </a:ext>
-            </a:extLst>
-          </p:cNvPr>
-          <p:cNvPicPr>
-            <a:picLocks noChangeAspect="1" noChangeArrowheads="1"/>
-          </p:cNvPicPr>
-          <p:nvPr/>
-        </p:nvPicPr>
-        <p:blipFill>
-          <a:blip r:embed="rId14">
-            <a:extLst>
-              <a:ext uri="{28A0092B-C50C-407E-A947-70E740481C1C}">
-                <a14:useLocalDpi xmlns:a14="http://schemas.microsoft.com/office/drawing/2010/main" val="0"/>
-              </a:ext>
-            </a:extLst>
-          </a:blip>
-          <a:srcRect/>
-          <a:stretch>
-            <a:fillRect/>
-          </a:stretch>
-        </p:blipFill>
-        <p:spPr bwMode="auto">
-          <a:xfrm>
-            <a:off x="13057429" y="24218854"/>
-            <a:ext cx="980670" cy="1099687"/>
-          </a:xfrm>
-          <a:prstGeom prst="rect">
-            <a:avLst/>
-          </a:prstGeom>
-          <a:noFill/>
-          <a:extLst>
-            <a:ext uri="{909E8E84-426E-40DD-AFC4-6F175D3DCCD1}">
-              <a14:hiddenFill xmlns:a14="http://schemas.microsoft.com/office/drawing/2010/main">
-                <a:solidFill>
-                  <a:srgbClr val="FFFFFF"/>
-                </a:solidFill>
-              </a14:hiddenFill>
-            </a:ext>
-          </a:extLst>
-        </p:spPr>
-      </p:pic>
-      <p:pic>
-        <p:nvPicPr>
-          <p:cNvPr id="22" name="Picture 21">
-            <a:extLst>
-              <a:ext uri="{FF2B5EF4-FFF2-40B4-BE49-F238E27FC236}">
-                <a16:creationId xmlns:a16="http://schemas.microsoft.com/office/drawing/2014/main" id="{8DD4F6BC-CE86-782B-B4CB-46A593E665E4}"/>
-              </a:ext>
-            </a:extLst>
-          </p:cNvPr>
-          <p:cNvPicPr>
-            <a:picLocks noChangeAspect="1"/>
-          </p:cNvPicPr>
-          <p:nvPr/>
-        </p:nvPicPr>
-        <p:blipFill>
-          <a:blip r:embed="rId15"/>
-          <a:stretch>
-            <a:fillRect/>
-          </a:stretch>
-        </p:blipFill>
-        <p:spPr>
-          <a:xfrm>
-            <a:off x="152686" y="22501194"/>
-            <a:ext cx="8973765" cy="1393327"/>
-          </a:xfrm>
-          <a:prstGeom prst="rect">
-            <a:avLst/>
-          </a:prstGeom>
-        </p:spPr>
-      </p:pic>
-      <p:sp>
-        <p:nvSpPr>
-          <p:cNvPr id="24" name="Rectangle 23">
-            <a:extLst>
-              <a:ext uri="{FF2B5EF4-FFF2-40B4-BE49-F238E27FC236}">
-                <a16:creationId xmlns:a16="http://schemas.microsoft.com/office/drawing/2014/main" id="{CFC46C49-48F4-1E14-1096-62BE837D2ED4}"/>
-              </a:ext>
-            </a:extLst>
-          </p:cNvPr>
-          <p:cNvSpPr/>
-          <p:nvPr/>
-        </p:nvSpPr>
-        <p:spPr>
-          <a:xfrm>
-            <a:off x="7353554" y="24732429"/>
-            <a:ext cx="5125522" cy="1323439"/>
-          </a:xfrm>
-          <a:prstGeom prst="rect">
-            <a:avLst/>
-          </a:prstGeom>
-        </p:spPr>
-        <p:txBody>
-          <a:bodyPr wrap="square">
-            <a:spAutoFit/>
-          </a:bodyPr>
-          <a:lstStyle/>
-          <a:p>
-            <a:r>
-              <a:rPr lang="en-AU" sz="4000" b="1" dirty="0">
-                <a:solidFill>
-                  <a:srgbClr val="002060"/>
-                </a:solidFill>
-                <a:latin typeface="Oxygen" panose="02000503000000000000" pitchFamily="2" charset="0"/>
-              </a:rPr>
-              <a:t>Follow </a:t>
-            </a:r>
-          </a:p>
-          <a:p>
-            <a:r>
-              <a:rPr lang="en-AU" sz="4000" b="1" dirty="0">
-                <a:solidFill>
-                  <a:srgbClr val="002060"/>
-                </a:solidFill>
-                <a:latin typeface="Oxygen" panose="02000503000000000000" pitchFamily="2" charset="0"/>
-              </a:rPr>
-              <a:t>for Discounts</a:t>
-            </a:r>
-          </a:p>
-        </p:txBody>
-      </p:sp>
-      <p:pic>
-        <p:nvPicPr>
-          <p:cNvPr id="25" name="Picture 24">
-            <a:extLst>
-              <a:ext uri="{FF2B5EF4-FFF2-40B4-BE49-F238E27FC236}">
-                <a16:creationId xmlns:a16="http://schemas.microsoft.com/office/drawing/2014/main" id="{85919C3E-DD25-C6A5-EE95-46930B790316}"/>
-              </a:ext>
-            </a:extLst>
-          </p:cNvPr>
-          <p:cNvPicPr>
-            <a:picLocks noChangeAspect="1"/>
-          </p:cNvPicPr>
-          <p:nvPr/>
-        </p:nvPicPr>
-        <p:blipFill>
-          <a:blip r:embed="rId11">
-            <a:extLst>
-              <a:ext uri="{28A0092B-C50C-407E-A947-70E740481C1C}">
-                <a14:useLocalDpi xmlns:a14="http://schemas.microsoft.com/office/drawing/2010/main" val="0"/>
-              </a:ext>
-            </a:extLst>
-          </a:blip>
-          <a:stretch>
-            <a:fillRect/>
-          </a:stretch>
-        </p:blipFill>
-        <p:spPr>
-          <a:xfrm>
-            <a:off x="13028749" y="23194090"/>
-            <a:ext cx="980670" cy="927095"/>
-          </a:xfrm>
-          <a:prstGeom prst="rect">
-            <a:avLst/>
-          </a:prstGeom>
-        </p:spPr>
-      </p:pic>
-      <p:pic>
-        <p:nvPicPr>
-          <p:cNvPr id="30" name="Picture 29">
-            <a:extLst>
-              <a:ext uri="{FF2B5EF4-FFF2-40B4-BE49-F238E27FC236}">
-                <a16:creationId xmlns:a16="http://schemas.microsoft.com/office/drawing/2014/main" id="{16A672BD-E5E1-C16D-817B-616C7A5F8583}"/>
-              </a:ext>
-            </a:extLst>
-          </p:cNvPr>
-          <p:cNvPicPr>
-            <a:picLocks noChangeAspect="1"/>
-          </p:cNvPicPr>
-          <p:nvPr/>
-        </p:nvPicPr>
-        <p:blipFill>
-          <a:blip r:embed="rId16">
-            <a:extLst>
-              <a:ext uri="{28A0092B-C50C-407E-A947-70E740481C1C}">
-                <a14:useLocalDpi xmlns:a14="http://schemas.microsoft.com/office/drawing/2010/main" val="0"/>
-              </a:ext>
-            </a:extLst>
-          </a:blip>
-          <a:stretch>
-            <a:fillRect/>
-          </a:stretch>
-        </p:blipFill>
-        <p:spPr>
-          <a:xfrm>
-            <a:off x="14964768" y="23124366"/>
-            <a:ext cx="2378235" cy="2378235"/>
-          </a:xfrm>
-          <a:prstGeom prst="rect">
-            <a:avLst/>
-          </a:prstGeom>
-        </p:spPr>
-      </p:pic>
-      <p:pic>
-        <p:nvPicPr>
-          <p:cNvPr id="15" name="Picture 14">
-            <a:extLst>
-              <a:ext uri="{FF2B5EF4-FFF2-40B4-BE49-F238E27FC236}">
-                <a16:creationId xmlns:a16="http://schemas.microsoft.com/office/drawing/2014/main" id="{1E17D4FD-A22C-510B-7BB4-CC629F43AA5D}"/>
-              </a:ext>
-            </a:extLst>
-          </p:cNvPr>
-          <p:cNvPicPr>
-            <a:picLocks noChangeAspect="1"/>
-          </p:cNvPicPr>
-          <p:nvPr/>
-        </p:nvPicPr>
-        <p:blipFill>
-          <a:blip r:embed="rId17">
-            <a:extLst>
-              <a:ext uri="{28A0092B-C50C-407E-A947-70E740481C1C}">
-                <a14:useLocalDpi xmlns:a14="http://schemas.microsoft.com/office/drawing/2010/main" val="0"/>
-              </a:ext>
-            </a:extLst>
-          </a:blip>
-          <a:stretch>
-            <a:fillRect/>
-          </a:stretch>
-        </p:blipFill>
-        <p:spPr>
-          <a:xfrm>
-            <a:off x="9374823" y="23124365"/>
-            <a:ext cx="2378235" cy="2378235"/>
-          </a:xfrm>
-          <a:prstGeom prst="rect">
-            <a:avLst/>
-          </a:prstGeom>
-        </p:spPr>
-      </p:pic>
-      <p:sp>
-        <p:nvSpPr>
-          <p:cNvPr id="16" name="Freeform: Shape 15">
-            <a:extLst>
-              <a:ext uri="{FF2B5EF4-FFF2-40B4-BE49-F238E27FC236}">
-                <a16:creationId xmlns:a16="http://schemas.microsoft.com/office/drawing/2014/main" id="{3A71AFBE-CE51-CBEC-D3E8-5B31C8E19C03}"/>
-              </a:ext>
-            </a:extLst>
-          </p:cNvPr>
-          <p:cNvSpPr/>
-          <p:nvPr/>
-        </p:nvSpPr>
-        <p:spPr>
-          <a:xfrm>
-            <a:off x="7681241" y="23492336"/>
-            <a:ext cx="1053434" cy="940552"/>
+            <a:off x="10707958" y="21231223"/>
+            <a:ext cx="870606" cy="777315"/>
           </a:xfrm>
           <a:custGeom>
             <a:avLst/>
@@ -6361,131 +6333,167 @@
           </a:p>
         </p:txBody>
       </p:sp>
-      <p:sp>
-        <p:nvSpPr>
-          <p:cNvPr id="33" name="TextBox 32">
+      <p:pic>
+        <p:nvPicPr>
+          <p:cNvPr id="10" name="Picture 9">
             <a:extLst>
               <a:ext uri="{FF2B5EF4-FFF2-40B4-BE49-F238E27FC236}">
-                <a16:creationId xmlns:a16="http://schemas.microsoft.com/office/drawing/2014/main" id="{A675385C-2527-1676-2A68-D3A0FFC1FBB2}"/>
+                <a16:creationId xmlns:a16="http://schemas.microsoft.com/office/drawing/2014/main" id="{D33FD638-1C52-3BC1-CB7D-EC07BF63562B}"/>
               </a:ext>
             </a:extLst>
           </p:cNvPr>
-          <p:cNvSpPr txBox="1"/>
+          <p:cNvPicPr>
+            <a:picLocks noChangeAspect="1"/>
+          </p:cNvPicPr>
           <p:nvPr/>
-        </p:nvSpPr>
-        <p:spPr>
-          <a:xfrm>
-            <a:off x="30563" y="26242715"/>
-            <a:ext cx="25507765" cy="6735947"/>
+        </p:nvPicPr>
+        <p:blipFill>
+          <a:blip r:embed="rId14"/>
+          <a:stretch>
+            <a:fillRect/>
+          </a:stretch>
+        </p:blipFill>
+        <p:spPr>
+          <a:xfrm>
+            <a:off x="116437" y="21129138"/>
+            <a:ext cx="9871142" cy="1532660"/>
+          </a:xfrm>
+          <a:prstGeom prst="rect">
+            <a:avLst/>
+          </a:prstGeom>
+        </p:spPr>
+      </p:pic>
+      <p:sp>
+        <p:nvSpPr>
+          <p:cNvPr id="11" name="Rectangle 10">
+            <a:extLst>
+              <a:ext uri="{FF2B5EF4-FFF2-40B4-BE49-F238E27FC236}">
+                <a16:creationId xmlns:a16="http://schemas.microsoft.com/office/drawing/2014/main" id="{E0F8FA35-38E4-02A6-947F-09F5A5E39B02}"/>
+              </a:ext>
+            </a:extLst>
+          </p:cNvPr>
+          <p:cNvSpPr/>
+          <p:nvPr/>
+        </p:nvSpPr>
+        <p:spPr>
+          <a:xfrm>
+            <a:off x="10097078" y="22263878"/>
+            <a:ext cx="3536694" cy="1200329"/>
+          </a:xfrm>
+          <a:prstGeom prst="rect">
+            <a:avLst/>
+          </a:prstGeom>
+        </p:spPr>
+        <p:txBody>
+          <a:bodyPr wrap="square">
+            <a:spAutoFit/>
+          </a:bodyPr>
+          <a:lstStyle/>
+          <a:p>
+            <a:r>
+              <a:rPr lang="en-AU" sz="3600" b="1" dirty="0">
+                <a:solidFill>
+                  <a:srgbClr val="002060"/>
+                </a:solidFill>
+                <a:latin typeface="Oxygen" panose="02000503000000000000" pitchFamily="2" charset="0"/>
+              </a:rPr>
+              <a:t>Follow</a:t>
+            </a:r>
+          </a:p>
+          <a:p>
+            <a:r>
+              <a:rPr lang="en-AU" sz="3600" b="1" dirty="0">
+                <a:solidFill>
+                  <a:srgbClr val="002060"/>
+                </a:solidFill>
+                <a:latin typeface="Oxygen" panose="02000503000000000000" pitchFamily="2" charset="0"/>
+              </a:rPr>
+              <a:t>for Discount</a:t>
+            </a:r>
+          </a:p>
+        </p:txBody>
+      </p:sp>
+      <p:pic>
+        <p:nvPicPr>
+          <p:cNvPr id="16" name="Picture 10" descr="New Instagram Logo PNG Images 2023">
+            <a:extLst>
+              <a:ext uri="{FF2B5EF4-FFF2-40B4-BE49-F238E27FC236}">
+                <a16:creationId xmlns:a16="http://schemas.microsoft.com/office/drawing/2014/main" id="{06C25FDB-1D89-1154-DF83-32DBDE994536}"/>
+              </a:ext>
+            </a:extLst>
+          </p:cNvPr>
+          <p:cNvPicPr>
+            <a:picLocks noChangeAspect="1" noChangeArrowheads="1"/>
+          </p:cNvPicPr>
+          <p:nvPr/>
+        </p:nvPicPr>
+        <p:blipFill>
+          <a:blip r:embed="rId15" cstate="print">
+            <a:extLst>
+              <a:ext uri="{28A0092B-C50C-407E-A947-70E740481C1C}">
+                <a14:useLocalDpi xmlns:a14="http://schemas.microsoft.com/office/drawing/2010/main" val="0"/>
+              </a:ext>
+            </a:extLst>
+          </a:blip>
+          <a:srcRect/>
+          <a:stretch>
+            <a:fillRect/>
+          </a:stretch>
+        </p:blipFill>
+        <p:spPr bwMode="auto">
+          <a:xfrm>
+            <a:off x="8299890" y="22398096"/>
+            <a:ext cx="918773" cy="918773"/>
           </a:xfrm>
           <a:prstGeom prst="rect">
             <a:avLst/>
           </a:prstGeom>
           <a:noFill/>
-        </p:spPr>
-        <p:txBody>
-          <a:bodyPr wrap="square">
-            <a:spAutoFit/>
-          </a:bodyPr>
-          <a:lstStyle/>
-          <a:p>
-            <a:pPr algn="ctr">
-              <a:lnSpc>
-                <a:spcPct val="150000"/>
-              </a:lnSpc>
-            </a:pPr>
-            <a:r>
-              <a:rPr lang="en-US" sz="9600" b="1" cap="small" dirty="0">
+          <a:extLst>
+            <a:ext uri="{909E8E84-426E-40DD-AFC4-6F175D3DCCD1}">
+              <a14:hiddenFill xmlns:a14="http://schemas.microsoft.com/office/drawing/2010/main">
                 <a:solidFill>
-                  <a:srgbClr val="C00000"/>
+                  <a:srgbClr val="FFFFFF"/>
                 </a:solidFill>
-                <a:latin typeface="Oxygen" panose="02000503000000000000" pitchFamily="2" charset="0"/>
-              </a:rPr>
-              <a:t>Artificial Intelligence, Robotics - Class III-XII</a:t>
-            </a:r>
-          </a:p>
-          <a:p>
-            <a:pPr algn="ctr"/>
-            <a:r>
-              <a:rPr lang="en-US" sz="9800" b="1" cap="small" dirty="0">
-                <a:solidFill>
-                  <a:schemeClr val="accent1">
-                    <a:lumMod val="50000"/>
-                  </a:schemeClr>
-                </a:solidFill>
-                <a:latin typeface="Oxygen" panose="02000503000000000000" pitchFamily="2" charset="0"/>
-              </a:rPr>
-              <a:t>Professional AI &amp; IT Training &amp; Projects </a:t>
-            </a:r>
-          </a:p>
-          <a:p>
-            <a:pPr algn="ctr">
-              <a:lnSpc>
-                <a:spcPct val="150000"/>
-              </a:lnSpc>
-            </a:pPr>
-            <a:r>
-              <a:rPr lang="en-US" sz="4400" b="1" cap="small" dirty="0">
-                <a:solidFill>
-                  <a:schemeClr val="accent1">
-                    <a:lumMod val="75000"/>
-                  </a:schemeClr>
-                </a:solidFill>
-                <a:latin typeface="Oxygen" panose="02000503000000000000" pitchFamily="2" charset="0"/>
-              </a:rPr>
-              <a:t>Data Science, Computer Vision, NLP, DSP, Python, Data Analytics, C, C++, IoT, Robotics</a:t>
-            </a:r>
-          </a:p>
-          <a:p>
-            <a:pPr algn="ctr">
-              <a:lnSpc>
-                <a:spcPct val="150000"/>
-              </a:lnSpc>
-            </a:pPr>
-            <a:r>
-              <a:rPr lang="en-US" sz="4400" b="1" cap="small" dirty="0">
-                <a:solidFill>
-                  <a:schemeClr val="accent1">
-                    <a:lumMod val="75000"/>
-                  </a:schemeClr>
-                </a:solidFill>
-                <a:latin typeface="Oxygen" panose="02000503000000000000" pitchFamily="2" charset="0"/>
-              </a:rPr>
-              <a:t>Java, .NET, JavaScript, ReactJS, Native, PHP, DevOps, Docker, Kubernetes, Cloud</a:t>
-            </a:r>
-          </a:p>
-          <a:p>
-            <a:pPr algn="ctr">
-              <a:lnSpc>
-                <a:spcPct val="150000"/>
-              </a:lnSpc>
-            </a:pPr>
-            <a:r>
-              <a:rPr lang="en-US" sz="4400" b="1" cap="small" dirty="0">
-                <a:solidFill>
-                  <a:schemeClr val="accent1">
-                    <a:lumMod val="75000"/>
-                  </a:schemeClr>
-                </a:solidFill>
-                <a:latin typeface="Oxygen" panose="02000503000000000000" pitchFamily="2" charset="0"/>
-              </a:rPr>
-              <a:t>Database, Firebase, Cyber Sec, Automation Test, Pmp, Agile, Office, Adv Excel, Tally, Html, Css</a:t>
-            </a:r>
-            <a:endParaRPr lang="en-US" sz="2800" b="1" cap="small" dirty="0">
-              <a:solidFill>
-                <a:schemeClr val="accent1">
-                  <a:lumMod val="50000"/>
-                </a:schemeClr>
-              </a:solidFill>
-              <a:latin typeface="Oxygen" panose="02000503000000000000" pitchFamily="2" charset="0"/>
-            </a:endParaRPr>
-          </a:p>
-        </p:txBody>
-      </p:sp>
+              </a14:hiddenFill>
+            </a:ext>
+          </a:extLst>
+        </p:spPr>
+      </p:pic>
+      <p:pic>
+        <p:nvPicPr>
+          <p:cNvPr id="28" name="Picture 27">
+            <a:extLst>
+              <a:ext uri="{FF2B5EF4-FFF2-40B4-BE49-F238E27FC236}">
+                <a16:creationId xmlns:a16="http://schemas.microsoft.com/office/drawing/2014/main" id="{0BD8670C-31E3-728E-D39F-991A4AD5B8D1}"/>
+              </a:ext>
+            </a:extLst>
+          </p:cNvPr>
+          <p:cNvPicPr>
+            <a:picLocks noChangeAspect="1"/>
+          </p:cNvPicPr>
+          <p:nvPr/>
+        </p:nvPicPr>
+        <p:blipFill>
+          <a:blip r:embed="rId16"/>
+          <a:stretch>
+            <a:fillRect/>
+          </a:stretch>
+        </p:blipFill>
+        <p:spPr>
+          <a:xfrm>
+            <a:off x="8484" y="18990922"/>
+            <a:ext cx="8463920" cy="2036285"/>
+          </a:xfrm>
+          <a:prstGeom prst="rect">
+            <a:avLst/>
+          </a:prstGeom>
+        </p:spPr>
+      </p:pic>
     </p:spTree>
     <p:extLst>
       <p:ext uri="{BB962C8B-B14F-4D97-AF65-F5344CB8AC3E}">
-        <p14:creationId xmlns:p14="http://schemas.microsoft.com/office/powerpoint/2010/main" val="2224659747"/>
+        <p14:creationId xmlns:p14="http://schemas.microsoft.com/office/powerpoint/2010/main" val="2561883501"/>
       </p:ext>
     </p:extLst>
   </p:cSld>

</xml_diff>